<commit_message>
2021/03/04  8:42:08 backup from windows, comments: 罗家集结构
</commit_message>
<xml_diff>
--- a/Read/Oracle/knowledge/Material/Oracle体系结构.pptx
+++ b/Read/Oracle/knowledge/Material/Oracle体系结构.pptx
@@ -7,6 +7,7 @@
   <p:sldIdLst>
     <p:sldId id="409" r:id="rId3"/>
     <p:sldId id="411" r:id="rId4"/>
+    <p:sldId id="412" r:id="rId5"/>
   </p:sldIdLst>
   <p:sldSz cx="12192000" cy="6858000"/>
   <p:notesSz cx="6858000" cy="9144000"/>
@@ -3417,7 +3418,6 @@
             <a:p>
               <a:r>
                 <a:rPr lang="zh-CN" altLang="en-US">
-                  <a:ln/>
                   <a:solidFill>
                     <a:schemeClr val="tx1"/>
                   </a:solidFill>
@@ -3432,7 +3432,6 @@
                 <a:t>实例</a:t>
               </a:r>
               <a:endParaRPr lang="zh-CN" altLang="en-US">
-                <a:ln/>
                 <a:solidFill>
                   <a:schemeClr val="tx1"/>
                 </a:solidFill>
@@ -3470,7 +3469,6 @@
             <a:p>
               <a:r>
                 <a:rPr lang="zh-CN" altLang="en-US">
-                  <a:ln/>
                   <a:solidFill>
                     <a:schemeClr val="tx1"/>
                   </a:solidFill>
@@ -3485,7 +3483,6 @@
                 <a:t>数据库</a:t>
               </a:r>
               <a:endParaRPr lang="zh-CN" altLang="en-US">
-                <a:ln/>
                 <a:solidFill>
                   <a:schemeClr val="tx1"/>
                 </a:solidFill>
@@ -3523,7 +3520,6 @@
             <a:p>
               <a:r>
                 <a:rPr lang="en-US" altLang="zh-CN" sz="1400">
-                  <a:ln/>
                   <a:solidFill>
                     <a:schemeClr val="tx1"/>
                   </a:solidFill>
@@ -3538,7 +3534,6 @@
                 <a:t>Oracle</a:t>
               </a:r>
               <a:endParaRPr lang="en-US" altLang="zh-CN" sz="1400">
-                <a:ln/>
                 <a:solidFill>
                   <a:schemeClr val="tx1"/>
                 </a:solidFill>
@@ -3554,7 +3549,6 @@
             <a:p>
               <a:r>
                 <a:rPr lang="en-US" altLang="zh-CN" sz="1400">
-                  <a:ln/>
                   <a:solidFill>
                     <a:schemeClr val="tx1"/>
                   </a:solidFill>
@@ -3569,7 +3563,6 @@
                 <a:t>Database</a:t>
               </a:r>
               <a:endParaRPr lang="en-US" altLang="zh-CN" sz="1400">
-                <a:ln/>
                 <a:solidFill>
                   <a:schemeClr val="tx1"/>
                 </a:solidFill>
@@ -3585,7 +3578,6 @@
             <a:p>
               <a:r>
                 <a:rPr lang="en-US" altLang="zh-CN" sz="1400">
-                  <a:ln/>
                   <a:solidFill>
                     <a:schemeClr val="tx1"/>
                   </a:solidFill>
@@ -3600,7 +3592,6 @@
                 <a:t>Server</a:t>
               </a:r>
               <a:endParaRPr lang="en-US" altLang="zh-CN" sz="1400">
-                <a:ln/>
                 <a:solidFill>
                   <a:schemeClr val="tx1"/>
                 </a:solidFill>
@@ -3787,7 +3778,6 @@
           <a:p>
             <a:r>
               <a:rPr lang="zh-CN" altLang="en-US">
-                <a:ln/>
                 <a:solidFill>
                   <a:schemeClr val="tx1"/>
                 </a:solidFill>
@@ -3803,7 +3793,6 @@
             </a:r>
             <a:r>
               <a:rPr lang="en-US" altLang="zh-CN">
-                <a:ln/>
                 <a:solidFill>
                   <a:schemeClr val="tx1"/>
                 </a:solidFill>
@@ -3819,7 +3808,6 @@
             </a:r>
             <a:r>
               <a:rPr lang="zh-CN" altLang="en-US">
-                <a:ln/>
                 <a:solidFill>
                   <a:schemeClr val="tx1"/>
                 </a:solidFill>
@@ -3834,7 +3822,6 @@
               <a:t>例</a:t>
             </a:r>
             <a:endParaRPr lang="zh-CN" altLang="en-US">
-              <a:ln/>
               <a:solidFill>
                 <a:schemeClr val="tx1"/>
               </a:solidFill>
@@ -3902,7 +3889,6 @@
           <a:p>
             <a:r>
               <a:rPr lang="zh-CN" altLang="en-US">
-                <a:ln/>
                 <a:solidFill>
                   <a:schemeClr val="accent1"/>
                 </a:solidFill>
@@ -3917,7 +3903,6 @@
               <a:t>数  据  库</a:t>
             </a:r>
             <a:endParaRPr lang="zh-CN" altLang="en-US">
-              <a:ln/>
               <a:solidFill>
                 <a:schemeClr val="accent1"/>
               </a:solidFill>
@@ -4001,7 +3986,6 @@
           <a:p>
             <a:r>
               <a:rPr lang="zh-CN" altLang="en-US" sz="1600">
-                <a:ln/>
                 <a:solidFill>
                   <a:schemeClr val="accent6">
                     <a:lumMod val="50000"/>
@@ -4013,7 +3997,6 @@
               <a:t>内 存 结 构</a:t>
             </a:r>
             <a:endParaRPr lang="zh-CN" altLang="en-US" sz="1600">
-              <a:ln/>
               <a:solidFill>
                 <a:schemeClr val="accent6">
                   <a:lumMod val="50000"/>
@@ -4052,7 +4035,6 @@
           <a:p>
             <a:r>
               <a:rPr lang="zh-CN" altLang="en-US">
-                <a:ln/>
                 <a:gradFill>
                   <a:gsLst>
                     <a:gs pos="0">
@@ -4080,7 +4062,6 @@
             </a:r>
             <a:r>
               <a:rPr lang="en-US" altLang="zh-CN">
-                <a:ln/>
                 <a:gradFill>
                   <a:gsLst>
                     <a:gs pos="0">
@@ -4108,7 +4089,6 @@
             </a:r>
             <a:r>
               <a:rPr lang="zh-CN" altLang="en-US">
-                <a:ln/>
                 <a:gradFill>
                   <a:gsLst>
                     <a:gs pos="0">
@@ -4135,7 +4115,6 @@
               <a:t>）</a:t>
             </a:r>
             <a:endParaRPr lang="zh-CN" altLang="en-US">
-              <a:ln/>
               <a:gradFill>
                 <a:gsLst>
                   <a:gs pos="0">
@@ -5760,6 +5739,436 @@
 </p:sld>
 </file>
 
+<file path=ppt/slides/slide3.xml><?xml version="1.0" encoding="utf-8"?>
+<p:sld xmlns:a="http://schemas.openxmlformats.org/drawingml/2006/main" xmlns:r="http://schemas.openxmlformats.org/officeDocument/2006/relationships" xmlns:p="http://schemas.openxmlformats.org/presentationml/2006/main">
+  <p:cSld>
+    <p:spTree>
+      <p:nvGrpSpPr>
+        <p:cNvPr id="1" name=""/>
+        <p:cNvGrpSpPr/>
+        <p:nvPr/>
+      </p:nvGrpSpPr>
+      <p:grpSpPr>
+        <a:xfrm>
+          <a:off x="0" y="0"/>
+          <a:ext cx="0" cy="0"/>
+          <a:chOff x="0" y="0"/>
+          <a:chExt cx="0" cy="0"/>
+        </a:xfrm>
+      </p:grpSpPr>
+      <p:sp>
+        <p:nvSpPr>
+          <p:cNvPr id="4" name="椭圆 3"/>
+          <p:cNvSpPr/>
+          <p:nvPr/>
+        </p:nvSpPr>
+        <p:spPr>
+          <a:xfrm>
+            <a:off x="3556635" y="1027430"/>
+            <a:ext cx="5078095" cy="4802505"/>
+          </a:xfrm>
+          <a:prstGeom prst="ellipse">
+            <a:avLst/>
+          </a:prstGeom>
+          <a:solidFill>
+            <a:schemeClr val="accent2">
+              <a:lumMod val="60000"/>
+              <a:lumOff val="40000"/>
+            </a:schemeClr>
+          </a:solidFill>
+          <a:ln>
+            <a:noFill/>
+          </a:ln>
+        </p:spPr>
+        <p:style>
+          <a:lnRef idx="2">
+            <a:schemeClr val="accent1">
+              <a:shade val="50000"/>
+            </a:schemeClr>
+          </a:lnRef>
+          <a:fillRef idx="1">
+            <a:schemeClr val="accent1"/>
+          </a:fillRef>
+          <a:effectRef idx="0">
+            <a:schemeClr val="accent1"/>
+          </a:effectRef>
+          <a:fontRef idx="minor">
+            <a:schemeClr val="lt1"/>
+          </a:fontRef>
+        </p:style>
+        <p:txBody>
+          <a:bodyPr rtlCol="0" anchor="ctr"/>
+          <a:p>
+            <a:pPr algn="ctr"/>
+            <a:endParaRPr lang="zh-CN" altLang="en-US"/>
+          </a:p>
+        </p:txBody>
+      </p:sp>
+      <p:sp>
+        <p:nvSpPr>
+          <p:cNvPr id="5" name="椭圆 4"/>
+          <p:cNvSpPr/>
+          <p:nvPr/>
+        </p:nvSpPr>
+        <p:spPr>
+          <a:xfrm>
+            <a:off x="4537075" y="2173605"/>
+            <a:ext cx="3726180" cy="3241675"/>
+          </a:xfrm>
+          <a:prstGeom prst="ellipse">
+            <a:avLst/>
+          </a:prstGeom>
+          <a:ln>
+            <a:noFill/>
+          </a:ln>
+        </p:spPr>
+        <p:style>
+          <a:lnRef idx="2">
+            <a:schemeClr val="accent3">
+              <a:shade val="50000"/>
+            </a:schemeClr>
+          </a:lnRef>
+          <a:fillRef idx="1">
+            <a:schemeClr val="accent3"/>
+          </a:fillRef>
+          <a:effectRef idx="0">
+            <a:schemeClr val="accent3"/>
+          </a:effectRef>
+          <a:fontRef idx="minor">
+            <a:schemeClr val="lt1"/>
+          </a:fontRef>
+        </p:style>
+        <p:txBody>
+          <a:bodyPr rtlCol="0" anchor="ctr"/>
+          <a:p>
+            <a:pPr algn="ctr"/>
+            <a:endParaRPr lang="zh-CN" altLang="en-US"/>
+          </a:p>
+        </p:txBody>
+      </p:sp>
+      <p:sp>
+        <p:nvSpPr>
+          <p:cNvPr id="6" name="椭圆 5"/>
+          <p:cNvSpPr/>
+          <p:nvPr/>
+        </p:nvSpPr>
+        <p:spPr>
+          <a:xfrm>
+            <a:off x="5162550" y="2719070"/>
+            <a:ext cx="2738755" cy="2415540"/>
+          </a:xfrm>
+          <a:prstGeom prst="ellipse">
+            <a:avLst/>
+          </a:prstGeom>
+          <a:ln>
+            <a:noFill/>
+          </a:ln>
+        </p:spPr>
+        <p:style>
+          <a:lnRef idx="2">
+            <a:schemeClr val="accent4">
+              <a:shade val="50000"/>
+            </a:schemeClr>
+          </a:lnRef>
+          <a:fillRef idx="1">
+            <a:schemeClr val="accent4"/>
+          </a:fillRef>
+          <a:effectRef idx="0">
+            <a:schemeClr val="accent4"/>
+          </a:effectRef>
+          <a:fontRef idx="minor">
+            <a:schemeClr val="lt1"/>
+          </a:fontRef>
+        </p:style>
+        <p:txBody>
+          <a:bodyPr rtlCol="0" anchor="ctr"/>
+          <a:p>
+            <a:pPr algn="ctr"/>
+            <a:endParaRPr lang="zh-CN" altLang="en-US"/>
+          </a:p>
+        </p:txBody>
+      </p:sp>
+      <p:sp>
+        <p:nvSpPr>
+          <p:cNvPr id="7" name="椭圆 6"/>
+          <p:cNvSpPr/>
+          <p:nvPr/>
+        </p:nvSpPr>
+        <p:spPr>
+          <a:xfrm>
+            <a:off x="5711190" y="3204210"/>
+            <a:ext cx="2016125" cy="1740535"/>
+          </a:xfrm>
+          <a:prstGeom prst="ellipse">
+            <a:avLst/>
+          </a:prstGeom>
+          <a:ln>
+            <a:noFill/>
+          </a:ln>
+        </p:spPr>
+        <p:style>
+          <a:lnRef idx="3">
+            <a:schemeClr val="lt1"/>
+          </a:lnRef>
+          <a:fillRef idx="1">
+            <a:schemeClr val="accent5"/>
+          </a:fillRef>
+          <a:effectRef idx="1">
+            <a:schemeClr val="accent5"/>
+          </a:effectRef>
+          <a:fontRef idx="minor">
+            <a:schemeClr val="lt1"/>
+          </a:fontRef>
+        </p:style>
+        <p:txBody>
+          <a:bodyPr rtlCol="0" anchor="ctr"/>
+          <a:p>
+            <a:pPr algn="ctr"/>
+            <a:endParaRPr lang="zh-CN" altLang="en-US"/>
+          </a:p>
+        </p:txBody>
+      </p:sp>
+      <p:sp>
+        <p:nvSpPr>
+          <p:cNvPr id="8" name="椭圆 7"/>
+          <p:cNvSpPr/>
+          <p:nvPr/>
+        </p:nvSpPr>
+        <p:spPr>
+          <a:xfrm>
+            <a:off x="6209665" y="3749040"/>
+            <a:ext cx="1293495" cy="1045845"/>
+          </a:xfrm>
+          <a:prstGeom prst="ellipse">
+            <a:avLst/>
+          </a:prstGeom>
+          <a:ln>
+            <a:noFill/>
+          </a:ln>
+        </p:spPr>
+        <p:style>
+          <a:lnRef idx="2">
+            <a:schemeClr val="accent6">
+              <a:shade val="50000"/>
+            </a:schemeClr>
+          </a:lnRef>
+          <a:fillRef idx="1">
+            <a:schemeClr val="accent6"/>
+          </a:fillRef>
+          <a:effectRef idx="0">
+            <a:schemeClr val="accent6"/>
+          </a:effectRef>
+          <a:fontRef idx="minor">
+            <a:schemeClr val="lt1"/>
+          </a:fontRef>
+        </p:style>
+        <p:txBody>
+          <a:bodyPr rtlCol="0" anchor="ctr"/>
+          <a:p>
+            <a:pPr algn="ctr"/>
+            <a:r>
+              <a:rPr lang="zh-CN" altLang="en-US"/>
+              <a:t>块</a:t>
+            </a:r>
+            <a:r>
+              <a:rPr lang="en-US" altLang="zh-CN"/>
+              <a:t>(Block)</a:t>
+            </a:r>
+            <a:endParaRPr lang="en-US" altLang="zh-CN"/>
+          </a:p>
+        </p:txBody>
+      </p:sp>
+      <p:sp>
+        <p:nvSpPr>
+          <p:cNvPr id="10" name="文本框 9"/>
+          <p:cNvSpPr txBox="1"/>
+          <p:nvPr/>
+        </p:nvSpPr>
+        <p:spPr>
+          <a:xfrm>
+            <a:off x="6101080" y="3380740"/>
+            <a:ext cx="1235710" cy="368300"/>
+          </a:xfrm>
+          <a:prstGeom prst="rect">
+            <a:avLst/>
+          </a:prstGeom>
+          <a:noFill/>
+        </p:spPr>
+        <p:txBody>
+          <a:bodyPr wrap="square" rtlCol="0">
+            <a:spAutoFit/>
+          </a:bodyPr>
+          <a:p>
+            <a:r>
+              <a:rPr lang="zh-CN" altLang="en-US">
+                <a:solidFill>
+                  <a:schemeClr val="bg1"/>
+                </a:solidFill>
+              </a:rPr>
+              <a:t>区</a:t>
+            </a:r>
+            <a:r>
+              <a:rPr lang="en-US" altLang="zh-CN">
+                <a:solidFill>
+                  <a:schemeClr val="bg1"/>
+                </a:solidFill>
+              </a:rPr>
+              <a:t>(Extent)</a:t>
+            </a:r>
+            <a:endParaRPr lang="en-US" altLang="zh-CN">
+              <a:solidFill>
+                <a:schemeClr val="bg1"/>
+              </a:solidFill>
+            </a:endParaRPr>
+          </a:p>
+        </p:txBody>
+      </p:sp>
+      <p:sp>
+        <p:nvSpPr>
+          <p:cNvPr id="11" name="文本框 10"/>
+          <p:cNvSpPr txBox="1"/>
+          <p:nvPr/>
+        </p:nvSpPr>
+        <p:spPr>
+          <a:xfrm>
+            <a:off x="5761990" y="2863850"/>
+            <a:ext cx="1569085" cy="368300"/>
+          </a:xfrm>
+          <a:prstGeom prst="rect">
+            <a:avLst/>
+          </a:prstGeom>
+          <a:noFill/>
+        </p:spPr>
+        <p:txBody>
+          <a:bodyPr wrap="square" rtlCol="0">
+            <a:spAutoFit/>
+          </a:bodyPr>
+          <a:p>
+            <a:r>
+              <a:rPr lang="zh-CN" altLang="en-US">
+                <a:solidFill>
+                  <a:schemeClr val="bg1"/>
+                </a:solidFill>
+              </a:rPr>
+              <a:t>段</a:t>
+            </a:r>
+            <a:r>
+              <a:rPr lang="en-US" altLang="zh-CN">
+                <a:solidFill>
+                  <a:schemeClr val="bg1"/>
+                </a:solidFill>
+              </a:rPr>
+              <a:t>(Segment)</a:t>
+            </a:r>
+            <a:endParaRPr lang="en-US" altLang="zh-CN">
+              <a:solidFill>
+                <a:schemeClr val="bg1"/>
+              </a:solidFill>
+            </a:endParaRPr>
+          </a:p>
+        </p:txBody>
+      </p:sp>
+      <p:sp>
+        <p:nvSpPr>
+          <p:cNvPr id="12" name="文本框 11"/>
+          <p:cNvSpPr txBox="1"/>
+          <p:nvPr/>
+        </p:nvSpPr>
+        <p:spPr>
+          <a:xfrm>
+            <a:off x="5342890" y="2377440"/>
+            <a:ext cx="2377440" cy="368300"/>
+          </a:xfrm>
+          <a:prstGeom prst="rect">
+            <a:avLst/>
+          </a:prstGeom>
+          <a:noFill/>
+        </p:spPr>
+        <p:txBody>
+          <a:bodyPr wrap="square" rtlCol="0">
+            <a:spAutoFit/>
+          </a:bodyPr>
+          <a:p>
+            <a:r>
+              <a:rPr lang="zh-CN" altLang="en-US">
+                <a:solidFill>
+                  <a:schemeClr val="bg1"/>
+                </a:solidFill>
+              </a:rPr>
+              <a:t>表空间</a:t>
+            </a:r>
+            <a:r>
+              <a:rPr lang="en-US" altLang="zh-CN">
+                <a:solidFill>
+                  <a:schemeClr val="bg1"/>
+                </a:solidFill>
+              </a:rPr>
+              <a:t>(Tablespace)</a:t>
+            </a:r>
+            <a:endParaRPr lang="en-US" altLang="zh-CN">
+              <a:solidFill>
+                <a:schemeClr val="bg1"/>
+              </a:solidFill>
+            </a:endParaRPr>
+          </a:p>
+        </p:txBody>
+      </p:sp>
+      <p:sp>
+        <p:nvSpPr>
+          <p:cNvPr id="13" name="文本框 12"/>
+          <p:cNvSpPr txBox="1"/>
+          <p:nvPr/>
+        </p:nvSpPr>
+        <p:spPr>
+          <a:xfrm>
+            <a:off x="4516755" y="1630680"/>
+            <a:ext cx="2111375" cy="368300"/>
+          </a:xfrm>
+          <a:prstGeom prst="rect">
+            <a:avLst/>
+          </a:prstGeom>
+          <a:noFill/>
+        </p:spPr>
+        <p:txBody>
+          <a:bodyPr wrap="square" rtlCol="0">
+            <a:spAutoFit/>
+          </a:bodyPr>
+          <a:p>
+            <a:r>
+              <a:rPr lang="zh-CN" altLang="en-US">
+                <a:solidFill>
+                  <a:schemeClr val="bg1"/>
+                </a:solidFill>
+              </a:rPr>
+              <a:t>数据库</a:t>
+            </a:r>
+            <a:r>
+              <a:rPr lang="en-US" altLang="zh-CN">
+                <a:solidFill>
+                  <a:schemeClr val="bg1"/>
+                </a:solidFill>
+              </a:rPr>
+              <a:t>(Database)</a:t>
+            </a:r>
+            <a:endParaRPr lang="en-US" altLang="zh-CN">
+              <a:solidFill>
+                <a:schemeClr val="bg1"/>
+              </a:solidFill>
+            </a:endParaRPr>
+          </a:p>
+        </p:txBody>
+      </p:sp>
+    </p:spTree>
+    <p:custDataLst>
+      <p:tags r:id="rId1"/>
+    </p:custDataLst>
+  </p:cSld>
+  <p:clrMapOvr>
+    <a:masterClrMapping/>
+  </p:clrMapOvr>
+</p:sld>
+</file>
+
 <file path=ppt/tags/tag1.xml><?xml version="1.0" encoding="utf-8"?>
 <p:tagLst xmlns:p="http://schemas.openxmlformats.org/presentationml/2006/main">
   <p:tag name="KSO_WM_UNIT_HIGHLIGHT" val="0"/>
@@ -6558,6 +6967,27 @@
   <p:tag name="KSO_WM_BEAUTIFY_FLAG" val="#wm#"/>
   <p:tag name="KSO_WM_TEMPLATE_CATEGORY" val="custom"/>
   <p:tag name="KSO_WM_TEMPLATE_INDEX" val="20205176"/>
+</p:tagLst>
+</file>
+
+<file path=ppt/tags/tag65.xml><?xml version="1.0" encoding="utf-8"?>
+<p:tagLst xmlns:p="http://schemas.openxmlformats.org/presentationml/2006/main">
+  <p:tag name="KSO_WM_SLIDE_ID" val="custom20205176_1"/>
+  <p:tag name="KSO_WM_TEMPLATE_SUBCATEGORY" val="19"/>
+  <p:tag name="KSO_WM_TEMPLATE_MASTER_TYPE" val="0"/>
+  <p:tag name="KSO_WM_TEMPLATE_COLOR_TYPE" val="1"/>
+  <p:tag name="KSO_WM_SLIDE_TYPE" val="title"/>
+  <p:tag name="KSO_WM_SLIDE_SUBTYPE" val="defaultBlank"/>
+  <p:tag name="KSO_WM_SLIDE_ITEM_CNT" val="0"/>
+  <p:tag name="KSO_WM_SLIDE_INDEX" val="1"/>
+  <p:tag name="KSO_WM_TAG_VERSION" val="1.0"/>
+  <p:tag name="KSO_WM_BEAUTIFY_FLAG" val="#wm#"/>
+  <p:tag name="KSO_WM_TEMPLATE_CATEGORY" val="custom"/>
+  <p:tag name="KSO_WM_TEMPLATE_INDEX" val="20205176"/>
+  <p:tag name="KSO_WM_SLIDE_LAYOUT" val="a_b"/>
+  <p:tag name="KSO_WM_SLIDE_LAYOUT_CNT" val="1_1"/>
+  <p:tag name="KSO_WM_UNIT_SHOW_EDIT_AREA_INDICATION" val="1"/>
+  <p:tag name="KSO_WM_TEMPLATE_THUMBS_INDEX" val="1、4、7、12、13、14、15、16、17、18、20、24、25、28、33、36、40、43、44"/>
 </p:tagLst>
 </file>
 

</xml_diff>

<commit_message>
2021/03/05  7:38:45 backup from windows, comments: 逻辑结构
</commit_message>
<xml_diff>
--- a/Read/Oracle/knowledge/Material/Oracle体系结构.pptx
+++ b/Read/Oracle/knowledge/Material/Oracle体系结构.pptx
@@ -8,6 +8,7 @@
     <p:sldId id="409" r:id="rId3"/>
     <p:sldId id="411" r:id="rId4"/>
     <p:sldId id="412" r:id="rId5"/>
+    <p:sldId id="413" r:id="rId6"/>
   </p:sldIdLst>
   <p:sldSz cx="12192000" cy="6858000"/>
   <p:notesSz cx="6858000" cy="9144000"/>
@@ -6169,6 +6170,419 @@
 </p:sld>
 </file>
 
+<file path=ppt/slides/slide4.xml><?xml version="1.0" encoding="utf-8"?>
+<p:sld xmlns:a="http://schemas.openxmlformats.org/drawingml/2006/main" xmlns:r="http://schemas.openxmlformats.org/officeDocument/2006/relationships" xmlns:p="http://schemas.openxmlformats.org/presentationml/2006/main">
+  <p:cSld>
+    <p:spTree>
+      <p:nvGrpSpPr>
+        <p:cNvPr id="1" name=""/>
+        <p:cNvGrpSpPr/>
+        <p:nvPr/>
+      </p:nvGrpSpPr>
+      <p:grpSpPr>
+        <a:xfrm>
+          <a:off x="0" y="0"/>
+          <a:ext cx="0" cy="0"/>
+          <a:chOff x="0" y="0"/>
+          <a:chExt cx="0" cy="0"/>
+        </a:xfrm>
+      </p:grpSpPr>
+      <p:sp>
+        <p:nvSpPr>
+          <p:cNvPr id="4" name="矩形 3"/>
+          <p:cNvSpPr/>
+          <p:nvPr/>
+        </p:nvSpPr>
+        <p:spPr>
+          <a:xfrm>
+            <a:off x="4554855" y="1221740"/>
+            <a:ext cx="2044700" cy="703580"/>
+          </a:xfrm>
+          <a:prstGeom prst="rect">
+            <a:avLst/>
+          </a:prstGeom>
+        </p:spPr>
+        <p:style>
+          <a:lnRef idx="2">
+            <a:schemeClr val="accent2">
+              <a:shade val="50000"/>
+            </a:schemeClr>
+          </a:lnRef>
+          <a:fillRef idx="1">
+            <a:schemeClr val="accent2"/>
+          </a:fillRef>
+          <a:effectRef idx="0">
+            <a:schemeClr val="accent2"/>
+          </a:effectRef>
+          <a:fontRef idx="minor">
+            <a:schemeClr val="lt1"/>
+          </a:fontRef>
+        </p:style>
+        <p:txBody>
+          <a:bodyPr rtlCol="0" anchor="ctr"/>
+          <a:p>
+            <a:pPr algn="ctr"/>
+            <a:endParaRPr lang="zh-CN" altLang="en-US"/>
+          </a:p>
+        </p:txBody>
+      </p:sp>
+      <p:sp>
+        <p:nvSpPr>
+          <p:cNvPr id="5" name="矩形 4"/>
+          <p:cNvSpPr/>
+          <p:nvPr/>
+        </p:nvSpPr>
+        <p:spPr>
+          <a:xfrm>
+            <a:off x="4554855" y="1925320"/>
+            <a:ext cx="2044700" cy="703580"/>
+          </a:xfrm>
+          <a:prstGeom prst="rect">
+            <a:avLst/>
+          </a:prstGeom>
+        </p:spPr>
+        <p:style>
+          <a:lnRef idx="2">
+            <a:schemeClr val="accent2">
+              <a:shade val="50000"/>
+            </a:schemeClr>
+          </a:lnRef>
+          <a:fillRef idx="1">
+            <a:schemeClr val="accent2"/>
+          </a:fillRef>
+          <a:effectRef idx="0">
+            <a:schemeClr val="accent2"/>
+          </a:effectRef>
+          <a:fontRef idx="minor">
+            <a:schemeClr val="lt1"/>
+          </a:fontRef>
+        </p:style>
+        <p:txBody>
+          <a:bodyPr rtlCol="0" anchor="ctr"/>
+          <a:p>
+            <a:pPr algn="ctr"/>
+            <a:endParaRPr lang="zh-CN" altLang="en-US"/>
+          </a:p>
+        </p:txBody>
+      </p:sp>
+      <p:sp>
+        <p:nvSpPr>
+          <p:cNvPr id="6" name="矩形 5"/>
+          <p:cNvSpPr/>
+          <p:nvPr/>
+        </p:nvSpPr>
+        <p:spPr>
+          <a:xfrm>
+            <a:off x="4554855" y="2628900"/>
+            <a:ext cx="2044700" cy="703580"/>
+          </a:xfrm>
+          <a:prstGeom prst="rect">
+            <a:avLst/>
+          </a:prstGeom>
+        </p:spPr>
+        <p:style>
+          <a:lnRef idx="2">
+            <a:schemeClr val="accent2">
+              <a:shade val="50000"/>
+            </a:schemeClr>
+          </a:lnRef>
+          <a:fillRef idx="1">
+            <a:schemeClr val="accent2"/>
+          </a:fillRef>
+          <a:effectRef idx="0">
+            <a:schemeClr val="accent2"/>
+          </a:effectRef>
+          <a:fontRef idx="minor">
+            <a:schemeClr val="lt1"/>
+          </a:fontRef>
+        </p:style>
+        <p:txBody>
+          <a:bodyPr rtlCol="0" anchor="ctr"/>
+          <a:p>
+            <a:pPr algn="ctr"/>
+            <a:endParaRPr lang="zh-CN" altLang="en-US"/>
+          </a:p>
+        </p:txBody>
+      </p:sp>
+      <p:sp>
+        <p:nvSpPr>
+          <p:cNvPr id="7" name="矩形 6"/>
+          <p:cNvSpPr/>
+          <p:nvPr/>
+        </p:nvSpPr>
+        <p:spPr>
+          <a:xfrm>
+            <a:off x="4554855" y="3332480"/>
+            <a:ext cx="2044700" cy="703580"/>
+          </a:xfrm>
+          <a:prstGeom prst="rect">
+            <a:avLst/>
+          </a:prstGeom>
+          <a:solidFill>
+            <a:schemeClr val="bg2">
+              <a:lumMod val="85000"/>
+            </a:schemeClr>
+          </a:solidFill>
+        </p:spPr>
+        <p:style>
+          <a:lnRef idx="2">
+            <a:schemeClr val="accent1">
+              <a:shade val="50000"/>
+            </a:schemeClr>
+          </a:lnRef>
+          <a:fillRef idx="1">
+            <a:schemeClr val="accent1"/>
+          </a:fillRef>
+          <a:effectRef idx="0">
+            <a:schemeClr val="accent1"/>
+          </a:effectRef>
+          <a:fontRef idx="minor">
+            <a:schemeClr val="lt1"/>
+          </a:fontRef>
+        </p:style>
+        <p:txBody>
+          <a:bodyPr rtlCol="0" anchor="ctr"/>
+          <a:p>
+            <a:pPr algn="ctr"/>
+            <a:endParaRPr lang="zh-CN" altLang="en-US"/>
+          </a:p>
+        </p:txBody>
+      </p:sp>
+      <p:sp>
+        <p:nvSpPr>
+          <p:cNvPr id="8" name="矩形 7"/>
+          <p:cNvSpPr/>
+          <p:nvPr/>
+        </p:nvSpPr>
+        <p:spPr>
+          <a:xfrm>
+            <a:off x="4554855" y="4036060"/>
+            <a:ext cx="2044700" cy="703580"/>
+          </a:xfrm>
+          <a:prstGeom prst="rect">
+            <a:avLst/>
+          </a:prstGeom>
+        </p:spPr>
+        <p:style>
+          <a:lnRef idx="2">
+            <a:schemeClr val="accent2">
+              <a:shade val="50000"/>
+            </a:schemeClr>
+          </a:lnRef>
+          <a:fillRef idx="1">
+            <a:schemeClr val="accent2"/>
+          </a:fillRef>
+          <a:effectRef idx="0">
+            <a:schemeClr val="accent2"/>
+          </a:effectRef>
+          <a:fontRef idx="minor">
+            <a:schemeClr val="lt1"/>
+          </a:fontRef>
+        </p:style>
+        <p:txBody>
+          <a:bodyPr rtlCol="0" anchor="ctr"/>
+          <a:p>
+            <a:pPr algn="ctr"/>
+            <a:endParaRPr lang="zh-CN" altLang="en-US"/>
+          </a:p>
+        </p:txBody>
+      </p:sp>
+      <p:sp>
+        <p:nvSpPr>
+          <p:cNvPr id="9" name="文本框 8"/>
+          <p:cNvSpPr txBox="1"/>
+          <p:nvPr/>
+        </p:nvSpPr>
+        <p:spPr>
+          <a:xfrm>
+            <a:off x="4595495" y="1275080"/>
+            <a:ext cx="538480" cy="306705"/>
+          </a:xfrm>
+          <a:prstGeom prst="rect">
+            <a:avLst/>
+          </a:prstGeom>
+          <a:noFill/>
+        </p:spPr>
+        <p:txBody>
+          <a:bodyPr wrap="none" rtlCol="0">
+            <a:spAutoFit/>
+          </a:bodyPr>
+          <a:p>
+            <a:r>
+              <a:rPr lang="zh-CN" altLang="en-US" sz="1400">
+                <a:solidFill>
+                  <a:schemeClr val="bg1"/>
+                </a:solidFill>
+              </a:rPr>
+              <a:t>块头</a:t>
+            </a:r>
+            <a:endParaRPr lang="zh-CN" altLang="en-US" sz="1400">
+              <a:solidFill>
+                <a:schemeClr val="bg1"/>
+              </a:solidFill>
+            </a:endParaRPr>
+          </a:p>
+        </p:txBody>
+      </p:sp>
+      <p:sp>
+        <p:nvSpPr>
+          <p:cNvPr id="10" name="文本框 9"/>
+          <p:cNvSpPr txBox="1"/>
+          <p:nvPr/>
+        </p:nvSpPr>
+        <p:spPr>
+          <a:xfrm>
+            <a:off x="4595495" y="1981835"/>
+            <a:ext cx="716280" cy="306705"/>
+          </a:xfrm>
+          <a:prstGeom prst="rect">
+            <a:avLst/>
+          </a:prstGeom>
+          <a:noFill/>
+        </p:spPr>
+        <p:txBody>
+          <a:bodyPr wrap="none" rtlCol="0">
+            <a:spAutoFit/>
+          </a:bodyPr>
+          <a:p>
+            <a:r>
+              <a:rPr lang="zh-CN" altLang="en-US" sz="1400">
+                <a:solidFill>
+                  <a:schemeClr val="bg1"/>
+                </a:solidFill>
+              </a:rPr>
+              <a:t>表目录</a:t>
+            </a:r>
+            <a:endParaRPr lang="zh-CN" altLang="en-US" sz="1400">
+              <a:solidFill>
+                <a:schemeClr val="bg1"/>
+              </a:solidFill>
+            </a:endParaRPr>
+          </a:p>
+        </p:txBody>
+      </p:sp>
+      <p:sp>
+        <p:nvSpPr>
+          <p:cNvPr id="11" name="文本框 10"/>
+          <p:cNvSpPr txBox="1"/>
+          <p:nvPr/>
+        </p:nvSpPr>
+        <p:spPr>
+          <a:xfrm>
+            <a:off x="4598035" y="2686685"/>
+            <a:ext cx="716280" cy="306705"/>
+          </a:xfrm>
+          <a:prstGeom prst="rect">
+            <a:avLst/>
+          </a:prstGeom>
+          <a:noFill/>
+        </p:spPr>
+        <p:txBody>
+          <a:bodyPr wrap="none" rtlCol="0">
+            <a:spAutoFit/>
+          </a:bodyPr>
+          <a:p>
+            <a:r>
+              <a:rPr lang="zh-CN" altLang="en-US" sz="1400">
+                <a:solidFill>
+                  <a:schemeClr val="bg1"/>
+                </a:solidFill>
+              </a:rPr>
+              <a:t>行目录</a:t>
+            </a:r>
+            <a:endParaRPr lang="zh-CN" altLang="en-US" sz="1400">
+              <a:solidFill>
+                <a:schemeClr val="bg1"/>
+              </a:solidFill>
+            </a:endParaRPr>
+          </a:p>
+        </p:txBody>
+      </p:sp>
+      <p:sp>
+        <p:nvSpPr>
+          <p:cNvPr id="12" name="文本框 11"/>
+          <p:cNvSpPr txBox="1"/>
+          <p:nvPr/>
+        </p:nvSpPr>
+        <p:spPr>
+          <a:xfrm>
+            <a:off x="4598035" y="3441700"/>
+            <a:ext cx="894080" cy="306705"/>
+          </a:xfrm>
+          <a:prstGeom prst="rect">
+            <a:avLst/>
+          </a:prstGeom>
+          <a:noFill/>
+        </p:spPr>
+        <p:txBody>
+          <a:bodyPr wrap="none" rtlCol="0">
+            <a:spAutoFit/>
+          </a:bodyPr>
+          <a:p>
+            <a:r>
+              <a:rPr lang="zh-CN" altLang="en-US" sz="1400">
+                <a:solidFill>
+                  <a:schemeClr val="tx1"/>
+                </a:solidFill>
+              </a:rPr>
+              <a:t>剩余空间</a:t>
+            </a:r>
+            <a:endParaRPr lang="zh-CN" altLang="en-US" sz="1400">
+              <a:solidFill>
+                <a:schemeClr val="tx1"/>
+              </a:solidFill>
+            </a:endParaRPr>
+          </a:p>
+        </p:txBody>
+      </p:sp>
+      <p:sp>
+        <p:nvSpPr>
+          <p:cNvPr id="13" name="文本框 12"/>
+          <p:cNvSpPr txBox="1"/>
+          <p:nvPr/>
+        </p:nvSpPr>
+        <p:spPr>
+          <a:xfrm>
+            <a:off x="4595495" y="4110990"/>
+            <a:ext cx="716280" cy="306705"/>
+          </a:xfrm>
+          <a:prstGeom prst="rect">
+            <a:avLst/>
+          </a:prstGeom>
+          <a:noFill/>
+        </p:spPr>
+        <p:txBody>
+          <a:bodyPr wrap="none" rtlCol="0">
+            <a:spAutoFit/>
+          </a:bodyPr>
+          <a:p>
+            <a:r>
+              <a:rPr lang="zh-CN" altLang="en-US" sz="1400">
+                <a:solidFill>
+                  <a:schemeClr val="bg1"/>
+                </a:solidFill>
+              </a:rPr>
+              <a:t>行数据</a:t>
+            </a:r>
+            <a:endParaRPr lang="zh-CN" altLang="en-US" sz="1400">
+              <a:solidFill>
+                <a:schemeClr val="bg1"/>
+              </a:solidFill>
+            </a:endParaRPr>
+          </a:p>
+        </p:txBody>
+      </p:sp>
+    </p:spTree>
+    <p:custDataLst>
+      <p:tags r:id="rId1"/>
+    </p:custDataLst>
+  </p:cSld>
+  <p:clrMapOvr>
+    <a:masterClrMapping/>
+  </p:clrMapOvr>
+</p:sld>
+</file>
+
 <file path=ppt/tags/tag1.xml><?xml version="1.0" encoding="utf-8"?>
 <p:tagLst xmlns:p="http://schemas.openxmlformats.org/presentationml/2006/main">
   <p:tag name="KSO_WM_UNIT_HIGHLIGHT" val="0"/>
@@ -6971,6 +7385,27 @@
 </file>
 
 <file path=ppt/tags/tag65.xml><?xml version="1.0" encoding="utf-8"?>
+<p:tagLst xmlns:p="http://schemas.openxmlformats.org/presentationml/2006/main">
+  <p:tag name="KSO_WM_SLIDE_ID" val="custom20205176_1"/>
+  <p:tag name="KSO_WM_TEMPLATE_SUBCATEGORY" val="19"/>
+  <p:tag name="KSO_WM_TEMPLATE_MASTER_TYPE" val="0"/>
+  <p:tag name="KSO_WM_TEMPLATE_COLOR_TYPE" val="1"/>
+  <p:tag name="KSO_WM_SLIDE_TYPE" val="title"/>
+  <p:tag name="KSO_WM_SLIDE_SUBTYPE" val="defaultBlank"/>
+  <p:tag name="KSO_WM_SLIDE_ITEM_CNT" val="0"/>
+  <p:tag name="KSO_WM_SLIDE_INDEX" val="1"/>
+  <p:tag name="KSO_WM_TAG_VERSION" val="1.0"/>
+  <p:tag name="KSO_WM_BEAUTIFY_FLAG" val="#wm#"/>
+  <p:tag name="KSO_WM_TEMPLATE_CATEGORY" val="custom"/>
+  <p:tag name="KSO_WM_TEMPLATE_INDEX" val="20205176"/>
+  <p:tag name="KSO_WM_SLIDE_LAYOUT" val="a_b"/>
+  <p:tag name="KSO_WM_SLIDE_LAYOUT_CNT" val="1_1"/>
+  <p:tag name="KSO_WM_UNIT_SHOW_EDIT_AREA_INDICATION" val="1"/>
+  <p:tag name="KSO_WM_TEMPLATE_THUMBS_INDEX" val="1、4、7、12、13、14、15、16、17、18、20、24、25、28、33、36、40、43、44"/>
+</p:tagLst>
+</file>
+
+<file path=ppt/tags/tag66.xml><?xml version="1.0" encoding="utf-8"?>
 <p:tagLst xmlns:p="http://schemas.openxmlformats.org/presentationml/2006/main">
   <p:tag name="KSO_WM_SLIDE_ID" val="custom20205176_1"/>
   <p:tag name="KSO_WM_TEMPLATE_SUBCATEGORY" val="19"/>

</xml_diff>

<commit_message>
2021/03/08 17:43:05 backup from windows, comments: 20210308
</commit_message>
<xml_diff>
--- a/Read/Oracle/knowledge/Material/Oracle体系结构.pptx
+++ b/Read/Oracle/knowledge/Material/Oracle体系结构.pptx
@@ -7,8 +7,9 @@
   <p:sldIdLst>
     <p:sldId id="409" r:id="rId3"/>
     <p:sldId id="411" r:id="rId4"/>
-    <p:sldId id="412" r:id="rId5"/>
-    <p:sldId id="413" r:id="rId6"/>
+    <p:sldId id="414" r:id="rId5"/>
+    <p:sldId id="412" r:id="rId6"/>
+    <p:sldId id="413" r:id="rId7"/>
   </p:sldIdLst>
   <p:sldSz cx="12192000" cy="6858000"/>
   <p:notesSz cx="6858000" cy="9144000"/>
@@ -5759,6 +5760,3515 @@
       </p:grpSpPr>
       <p:sp>
         <p:nvSpPr>
+          <p:cNvPr id="5" name="圆角矩形 4"/>
+          <p:cNvSpPr/>
+          <p:nvPr/>
+        </p:nvSpPr>
+        <p:spPr>
+          <a:xfrm>
+            <a:off x="2506345" y="2007235"/>
+            <a:ext cx="7179945" cy="2843530"/>
+          </a:xfrm>
+          <a:prstGeom prst="roundRect">
+            <a:avLst/>
+          </a:prstGeom>
+        </p:spPr>
+        <p:style>
+          <a:lnRef idx="1">
+            <a:schemeClr val="accent5"/>
+          </a:lnRef>
+          <a:fillRef idx="2">
+            <a:schemeClr val="accent5"/>
+          </a:fillRef>
+          <a:effectRef idx="1">
+            <a:schemeClr val="accent5"/>
+          </a:effectRef>
+          <a:fontRef idx="minor">
+            <a:schemeClr val="dk1"/>
+          </a:fontRef>
+        </p:style>
+        <p:txBody>
+          <a:bodyPr rtlCol="0" anchor="ctr"/>
+          <a:p>
+            <a:pPr algn="ctr"/>
+            <a:endParaRPr lang="zh-CN" altLang="en-US"/>
+          </a:p>
+        </p:txBody>
+      </p:sp>
+      <p:sp>
+        <p:nvSpPr>
+          <p:cNvPr id="10" name="文本框 9"/>
+          <p:cNvSpPr txBox="1"/>
+          <p:nvPr/>
+        </p:nvSpPr>
+        <p:spPr>
+          <a:xfrm>
+            <a:off x="3956685" y="610235"/>
+            <a:ext cx="4279265" cy="706755"/>
+          </a:xfrm>
+          <a:prstGeom prst="rect">
+            <a:avLst/>
+          </a:prstGeom>
+          <a:noFill/>
+        </p:spPr>
+        <p:txBody>
+          <a:bodyPr wrap="square" rtlCol="0">
+            <a:spAutoFit/>
+            <a:scene3d>
+              <a:camera prst="orthographicFront"/>
+              <a:lightRig rig="soft" dir="t">
+                <a:rot lat="0" lon="0" rev="15600000"/>
+              </a:lightRig>
+            </a:scene3d>
+            <a:sp3d extrusionH="57150" prstMaterial="softEdge">
+              <a:bevelT w="25400" h="38100"/>
+            </a:sp3d>
+          </a:bodyPr>
+          <a:p>
+            <a:r>
+              <a:rPr lang="en-US" altLang="zh-CN" sz="4000">
+                <a:solidFill>
+                  <a:schemeClr val="accent6">
+                    <a:lumMod val="50000"/>
+                  </a:schemeClr>
+                </a:solidFill>
+                <a:effectLst/>
+                <a:latin typeface="+mn-ea"/>
+              </a:rPr>
+              <a:t>Oracle</a:t>
+            </a:r>
+            <a:r>
+              <a:rPr lang="zh-CN" altLang="en-US" sz="4000">
+                <a:solidFill>
+                  <a:schemeClr val="accent6">
+                    <a:lumMod val="50000"/>
+                  </a:schemeClr>
+                </a:solidFill>
+                <a:effectLst/>
+                <a:latin typeface="+mn-ea"/>
+              </a:rPr>
+              <a:t>内 存 结 构</a:t>
+            </a:r>
+            <a:endParaRPr lang="zh-CN" altLang="en-US" sz="4000">
+              <a:solidFill>
+                <a:schemeClr val="accent6">
+                  <a:lumMod val="50000"/>
+                </a:schemeClr>
+              </a:solidFill>
+              <a:effectLst/>
+              <a:latin typeface="+mn-ea"/>
+            </a:endParaRPr>
+          </a:p>
+        </p:txBody>
+      </p:sp>
+      <p:sp>
+        <p:nvSpPr>
+          <p:cNvPr id="11" name="文本框 10"/>
+          <p:cNvSpPr txBox="1"/>
+          <p:nvPr/>
+        </p:nvSpPr>
+        <p:spPr>
+          <a:xfrm>
+            <a:off x="3249295" y="2091690"/>
+            <a:ext cx="5693410" cy="460375"/>
+          </a:xfrm>
+          <a:prstGeom prst="rect">
+            <a:avLst/>
+          </a:prstGeom>
+          <a:noFill/>
+        </p:spPr>
+        <p:txBody>
+          <a:bodyPr wrap="square" rtlCol="0">
+            <a:spAutoFit/>
+            <a:scene3d>
+              <a:camera prst="orthographicFront"/>
+              <a:lightRig rig="threePt" dir="t"/>
+            </a:scene3d>
+          </a:bodyPr>
+          <a:p>
+            <a:r>
+              <a:rPr lang="zh-CN" altLang="en-US" sz="2400">
+                <a:ln w="12700">
+                  <a:solidFill>
+                    <a:schemeClr val="accent3">
+                      <a:lumMod val="50000"/>
+                    </a:schemeClr>
+                  </a:solidFill>
+                  <a:prstDash val="solid"/>
+                </a:ln>
+                <a:pattFill prst="narHorz">
+                  <a:fgClr>
+                    <a:schemeClr val="accent3"/>
+                  </a:fgClr>
+                  <a:bgClr>
+                    <a:schemeClr val="accent3">
+                      <a:lumMod val="40000"/>
+                      <a:lumOff val="60000"/>
+                    </a:schemeClr>
+                  </a:bgClr>
+                </a:pattFill>
+                <a:effectLst>
+                  <a:innerShdw blurRad="177800">
+                    <a:schemeClr val="accent3">
+                      <a:lumMod val="50000"/>
+                    </a:schemeClr>
+                  </a:innerShdw>
+                </a:effectLst>
+              </a:rPr>
+              <a:t>系统全局区（</a:t>
+            </a:r>
+            <a:r>
+              <a:rPr lang="en-US" altLang="zh-CN" sz="2400">
+                <a:ln w="12700">
+                  <a:solidFill>
+                    <a:schemeClr val="accent3">
+                      <a:lumMod val="50000"/>
+                    </a:schemeClr>
+                  </a:solidFill>
+                  <a:prstDash val="solid"/>
+                </a:ln>
+                <a:pattFill prst="narHorz">
+                  <a:fgClr>
+                    <a:schemeClr val="accent3"/>
+                  </a:fgClr>
+                  <a:bgClr>
+                    <a:schemeClr val="accent3">
+                      <a:lumMod val="40000"/>
+                      <a:lumOff val="60000"/>
+                    </a:schemeClr>
+                  </a:bgClr>
+                </a:pattFill>
+                <a:effectLst>
+                  <a:innerShdw blurRad="177800">
+                    <a:schemeClr val="accent3">
+                      <a:lumMod val="50000"/>
+                    </a:schemeClr>
+                  </a:innerShdw>
+                </a:effectLst>
+              </a:rPr>
+              <a:t>System Global Area</a:t>
+            </a:r>
+            <a:r>
+              <a:rPr lang="zh-CN" altLang="en-US" sz="2400">
+                <a:ln w="12700">
+                  <a:solidFill>
+                    <a:schemeClr val="accent3">
+                      <a:lumMod val="50000"/>
+                    </a:schemeClr>
+                  </a:solidFill>
+                  <a:prstDash val="solid"/>
+                </a:ln>
+                <a:pattFill prst="narHorz">
+                  <a:fgClr>
+                    <a:schemeClr val="accent3"/>
+                  </a:fgClr>
+                  <a:bgClr>
+                    <a:schemeClr val="accent3">
+                      <a:lumMod val="40000"/>
+                      <a:lumOff val="60000"/>
+                    </a:schemeClr>
+                  </a:bgClr>
+                </a:pattFill>
+                <a:effectLst>
+                  <a:innerShdw blurRad="177800">
+                    <a:schemeClr val="accent3">
+                      <a:lumMod val="50000"/>
+                    </a:schemeClr>
+                  </a:innerShdw>
+                </a:effectLst>
+              </a:rPr>
+              <a:t>，</a:t>
+            </a:r>
+            <a:r>
+              <a:rPr lang="en-US" altLang="zh-CN" sz="2400">
+                <a:ln w="12700">
+                  <a:solidFill>
+                    <a:schemeClr val="accent3">
+                      <a:lumMod val="50000"/>
+                    </a:schemeClr>
+                  </a:solidFill>
+                  <a:prstDash val="solid"/>
+                </a:ln>
+                <a:pattFill prst="narHorz">
+                  <a:fgClr>
+                    <a:schemeClr val="accent3"/>
+                  </a:fgClr>
+                  <a:bgClr>
+                    <a:schemeClr val="accent3">
+                      <a:lumMod val="40000"/>
+                      <a:lumOff val="60000"/>
+                    </a:schemeClr>
+                  </a:bgClr>
+                </a:pattFill>
+                <a:effectLst>
+                  <a:innerShdw blurRad="177800">
+                    <a:schemeClr val="accent3">
+                      <a:lumMod val="50000"/>
+                    </a:schemeClr>
+                  </a:innerShdw>
+                </a:effectLst>
+              </a:rPr>
+              <a:t>SGA</a:t>
+            </a:r>
+            <a:r>
+              <a:rPr lang="zh-CN" altLang="en-US" sz="2400">
+                <a:ln w="12700">
+                  <a:solidFill>
+                    <a:schemeClr val="accent3">
+                      <a:lumMod val="50000"/>
+                    </a:schemeClr>
+                  </a:solidFill>
+                  <a:prstDash val="solid"/>
+                </a:ln>
+                <a:pattFill prst="narHorz">
+                  <a:fgClr>
+                    <a:schemeClr val="accent3"/>
+                  </a:fgClr>
+                  <a:bgClr>
+                    <a:schemeClr val="accent3">
+                      <a:lumMod val="40000"/>
+                      <a:lumOff val="60000"/>
+                    </a:schemeClr>
+                  </a:bgClr>
+                </a:pattFill>
+                <a:effectLst>
+                  <a:innerShdw blurRad="177800">
+                    <a:schemeClr val="accent3">
+                      <a:lumMod val="50000"/>
+                    </a:schemeClr>
+                  </a:innerShdw>
+                </a:effectLst>
+              </a:rPr>
+              <a:t>）</a:t>
+            </a:r>
+            <a:endParaRPr lang="zh-CN" altLang="en-US" sz="2400">
+              <a:ln w="12700">
+                <a:solidFill>
+                  <a:schemeClr val="accent3">
+                    <a:lumMod val="50000"/>
+                  </a:schemeClr>
+                </a:solidFill>
+                <a:prstDash val="solid"/>
+              </a:ln>
+              <a:pattFill prst="narHorz">
+                <a:fgClr>
+                  <a:schemeClr val="accent3"/>
+                </a:fgClr>
+                <a:bgClr>
+                  <a:schemeClr val="accent3">
+                    <a:lumMod val="40000"/>
+                    <a:lumOff val="60000"/>
+                  </a:schemeClr>
+                </a:bgClr>
+              </a:pattFill>
+              <a:effectLst>
+                <a:innerShdw blurRad="177800">
+                  <a:schemeClr val="accent3">
+                    <a:lumMod val="50000"/>
+                  </a:schemeClr>
+                </a:innerShdw>
+              </a:effectLst>
+            </a:endParaRPr>
+          </a:p>
+        </p:txBody>
+      </p:sp>
+      <p:sp>
+        <p:nvSpPr>
+          <p:cNvPr id="6" name="圆角矩形 5"/>
+          <p:cNvSpPr/>
+          <p:nvPr/>
+        </p:nvSpPr>
+        <p:spPr>
+          <a:xfrm>
+            <a:off x="2701290" y="2634615"/>
+            <a:ext cx="1854200" cy="2091690"/>
+          </a:xfrm>
+          <a:prstGeom prst="roundRect">
+            <a:avLst/>
+          </a:prstGeom>
+        </p:spPr>
+        <p:style>
+          <a:lnRef idx="1">
+            <a:schemeClr val="accent4"/>
+          </a:lnRef>
+          <a:fillRef idx="2">
+            <a:schemeClr val="accent4"/>
+          </a:fillRef>
+          <a:effectRef idx="1">
+            <a:schemeClr val="accent4"/>
+          </a:effectRef>
+          <a:fontRef idx="minor">
+            <a:schemeClr val="dk1"/>
+          </a:fontRef>
+        </p:style>
+        <p:txBody>
+          <a:bodyPr rtlCol="0" anchor="ctr"/>
+          <a:p>
+            <a:pPr algn="ctr"/>
+            <a:endParaRPr lang="zh-CN" altLang="en-US"/>
+          </a:p>
+        </p:txBody>
+      </p:sp>
+      <p:sp>
+        <p:nvSpPr>
+          <p:cNvPr id="42" name="矩形 41"/>
+          <p:cNvSpPr/>
+          <p:nvPr/>
+        </p:nvSpPr>
+        <p:spPr>
+          <a:xfrm>
+            <a:off x="8235950" y="2999740"/>
+            <a:ext cx="1347470" cy="270000"/>
+          </a:xfrm>
+          <a:prstGeom prst="rect">
+            <a:avLst/>
+          </a:prstGeom>
+        </p:spPr>
+        <p:style>
+          <a:lnRef idx="1">
+            <a:schemeClr val="accent6"/>
+          </a:lnRef>
+          <a:fillRef idx="2">
+            <a:schemeClr val="accent6"/>
+          </a:fillRef>
+          <a:effectRef idx="1">
+            <a:schemeClr val="accent6"/>
+          </a:effectRef>
+          <a:fontRef idx="minor">
+            <a:schemeClr val="dk1"/>
+          </a:fontRef>
+        </p:style>
+        <p:txBody>
+          <a:bodyPr rtlCol="0" anchor="ctr"/>
+          <a:p>
+            <a:pPr algn="ctr"/>
+            <a:r>
+              <a:rPr lang="en-US" altLang="zh-CN" sz="900"/>
+              <a:t>Large Pool</a:t>
+            </a:r>
+            <a:endParaRPr lang="en-US" altLang="zh-CN" sz="900"/>
+          </a:p>
+        </p:txBody>
+      </p:sp>
+      <p:sp>
+        <p:nvSpPr>
+          <p:cNvPr id="43" name="矩形 42"/>
+          <p:cNvSpPr/>
+          <p:nvPr/>
+        </p:nvSpPr>
+        <p:spPr>
+          <a:xfrm>
+            <a:off x="8235950" y="3705985"/>
+            <a:ext cx="1347470" cy="269875"/>
+          </a:xfrm>
+          <a:prstGeom prst="rect">
+            <a:avLst/>
+          </a:prstGeom>
+        </p:spPr>
+        <p:style>
+          <a:lnRef idx="1">
+            <a:schemeClr val="accent6"/>
+          </a:lnRef>
+          <a:fillRef idx="2">
+            <a:schemeClr val="accent6"/>
+          </a:fillRef>
+          <a:effectRef idx="1">
+            <a:schemeClr val="accent6"/>
+          </a:effectRef>
+          <a:fontRef idx="minor">
+            <a:schemeClr val="dk1"/>
+          </a:fontRef>
+        </p:style>
+        <p:txBody>
+          <a:bodyPr rtlCol="0" anchor="ctr"/>
+          <a:p>
+            <a:pPr algn="ctr"/>
+            <a:r>
+              <a:rPr lang="en-US" altLang="zh-CN" sz="900"/>
+              <a:t>Streams Pool</a:t>
+            </a:r>
+            <a:endParaRPr lang="en-US" altLang="zh-CN" sz="900"/>
+          </a:p>
+        </p:txBody>
+      </p:sp>
+      <p:sp>
+        <p:nvSpPr>
+          <p:cNvPr id="44" name="矩形 43"/>
+          <p:cNvSpPr/>
+          <p:nvPr/>
+        </p:nvSpPr>
+        <p:spPr>
+          <a:xfrm>
+            <a:off x="8235950" y="3352925"/>
+            <a:ext cx="1347470" cy="269875"/>
+          </a:xfrm>
+          <a:prstGeom prst="rect">
+            <a:avLst/>
+          </a:prstGeom>
+        </p:spPr>
+        <p:style>
+          <a:lnRef idx="1">
+            <a:schemeClr val="accent6"/>
+          </a:lnRef>
+          <a:fillRef idx="2">
+            <a:schemeClr val="accent6"/>
+          </a:fillRef>
+          <a:effectRef idx="1">
+            <a:schemeClr val="accent6"/>
+          </a:effectRef>
+          <a:fontRef idx="minor">
+            <a:schemeClr val="dk1"/>
+          </a:fontRef>
+        </p:style>
+        <p:txBody>
+          <a:bodyPr rtlCol="0" anchor="ctr"/>
+          <a:p>
+            <a:pPr algn="ctr"/>
+            <a:r>
+              <a:rPr lang="en-US" altLang="zh-CN" sz="900"/>
+              <a:t>Java Pool</a:t>
+            </a:r>
+            <a:endParaRPr lang="en-US" altLang="zh-CN" sz="900"/>
+          </a:p>
+        </p:txBody>
+      </p:sp>
+      <p:sp>
+        <p:nvSpPr>
+          <p:cNvPr id="36" name="文本框 35"/>
+          <p:cNvSpPr txBox="1"/>
+          <p:nvPr/>
+        </p:nvSpPr>
+        <p:spPr>
+          <a:xfrm>
+            <a:off x="3002280" y="2735580"/>
+            <a:ext cx="1252220" cy="306705"/>
+          </a:xfrm>
+          <a:prstGeom prst="rect">
+            <a:avLst/>
+          </a:prstGeom>
+          <a:noFill/>
+        </p:spPr>
+        <p:txBody>
+          <a:bodyPr wrap="square" rtlCol="0">
+            <a:spAutoFit/>
+          </a:bodyPr>
+          <a:p>
+            <a:r>
+              <a:rPr lang="en-US" altLang="zh-CN" sz="1400"/>
+              <a:t>Shared Pool</a:t>
+            </a:r>
+            <a:endParaRPr lang="en-US" altLang="zh-CN" sz="1400"/>
+          </a:p>
+        </p:txBody>
+      </p:sp>
+      <p:sp>
+        <p:nvSpPr>
+          <p:cNvPr id="37" name="矩形 36"/>
+          <p:cNvSpPr/>
+          <p:nvPr/>
+        </p:nvSpPr>
+        <p:spPr>
+          <a:xfrm>
+            <a:off x="2830830" y="3042285"/>
+            <a:ext cx="1584325" cy="820420"/>
+          </a:xfrm>
+          <a:prstGeom prst="rect">
+            <a:avLst/>
+          </a:prstGeom>
+        </p:spPr>
+        <p:style>
+          <a:lnRef idx="1">
+            <a:schemeClr val="accent6"/>
+          </a:lnRef>
+          <a:fillRef idx="2">
+            <a:schemeClr val="accent6"/>
+          </a:fillRef>
+          <a:effectRef idx="1">
+            <a:schemeClr val="accent6"/>
+          </a:effectRef>
+          <a:fontRef idx="minor">
+            <a:schemeClr val="dk1"/>
+          </a:fontRef>
+        </p:style>
+        <p:txBody>
+          <a:bodyPr rtlCol="0" anchor="t" anchorCtr="0"/>
+          <a:p>
+            <a:pPr algn="l"/>
+            <a:r>
+              <a:rPr lang="en-US" altLang="zh-CN" sz="900"/>
+              <a:t>Library Cache</a:t>
+            </a:r>
+            <a:endParaRPr lang="en-US" altLang="zh-CN" sz="900"/>
+          </a:p>
+        </p:txBody>
+      </p:sp>
+      <p:sp>
+        <p:nvSpPr>
+          <p:cNvPr id="8" name="圆角矩形 7"/>
+          <p:cNvSpPr/>
+          <p:nvPr/>
+        </p:nvSpPr>
+        <p:spPr>
+          <a:xfrm>
+            <a:off x="2877185" y="3288030"/>
+            <a:ext cx="1502410" cy="227965"/>
+          </a:xfrm>
+          <a:prstGeom prst="roundRect">
+            <a:avLst/>
+          </a:prstGeom>
+        </p:spPr>
+        <p:style>
+          <a:lnRef idx="1">
+            <a:schemeClr val="accent2"/>
+          </a:lnRef>
+          <a:fillRef idx="2">
+            <a:schemeClr val="accent2"/>
+          </a:fillRef>
+          <a:effectRef idx="1">
+            <a:schemeClr val="accent2"/>
+          </a:effectRef>
+          <a:fontRef idx="minor">
+            <a:schemeClr val="dk1"/>
+          </a:fontRef>
+        </p:style>
+        <p:txBody>
+          <a:bodyPr rtlCol="0" anchor="ctr"/>
+          <a:p>
+            <a:pPr algn="ctr"/>
+            <a:r>
+              <a:rPr lang="en-US" altLang="zh-CN" sz="1200"/>
+              <a:t>Shared SQL Area</a:t>
+            </a:r>
+            <a:endParaRPr lang="en-US" altLang="zh-CN" sz="1200"/>
+          </a:p>
+        </p:txBody>
+      </p:sp>
+      <p:sp>
+        <p:nvSpPr>
+          <p:cNvPr id="12" name="圆角矩形 11"/>
+          <p:cNvSpPr/>
+          <p:nvPr/>
+        </p:nvSpPr>
+        <p:spPr>
+          <a:xfrm>
+            <a:off x="2933700" y="3566795"/>
+            <a:ext cx="1378585" cy="227965"/>
+          </a:xfrm>
+          <a:prstGeom prst="roundRect">
+            <a:avLst/>
+          </a:prstGeom>
+        </p:spPr>
+        <p:style>
+          <a:lnRef idx="1">
+            <a:schemeClr val="accent2"/>
+          </a:lnRef>
+          <a:fillRef idx="2">
+            <a:schemeClr val="accent2"/>
+          </a:fillRef>
+          <a:effectRef idx="1">
+            <a:schemeClr val="accent2"/>
+          </a:effectRef>
+          <a:fontRef idx="minor">
+            <a:schemeClr val="dk1"/>
+          </a:fontRef>
+        </p:style>
+        <p:txBody>
+          <a:bodyPr rtlCol="0" anchor="ctr"/>
+          <a:p>
+            <a:pPr algn="ctr"/>
+            <a:r>
+              <a:rPr lang="en-US" altLang="zh-CN" sz="1200"/>
+              <a:t>Private SQL Area</a:t>
+            </a:r>
+            <a:endParaRPr lang="en-US" altLang="zh-CN" sz="1200"/>
+          </a:p>
+        </p:txBody>
+      </p:sp>
+      <p:sp>
+        <p:nvSpPr>
+          <p:cNvPr id="13" name="矩形 12"/>
+          <p:cNvSpPr/>
+          <p:nvPr/>
+        </p:nvSpPr>
+        <p:spPr>
+          <a:xfrm>
+            <a:off x="4726940" y="2634615"/>
+            <a:ext cx="1320165" cy="2092325"/>
+          </a:xfrm>
+          <a:prstGeom prst="rect">
+            <a:avLst/>
+          </a:prstGeom>
+        </p:spPr>
+        <p:style>
+          <a:lnRef idx="1">
+            <a:schemeClr val="accent4"/>
+          </a:lnRef>
+          <a:fillRef idx="2">
+            <a:schemeClr val="accent4"/>
+          </a:fillRef>
+          <a:effectRef idx="1">
+            <a:schemeClr val="accent4"/>
+          </a:effectRef>
+          <a:fontRef idx="minor">
+            <a:schemeClr val="dk1"/>
+          </a:fontRef>
+        </p:style>
+        <p:txBody>
+          <a:bodyPr rtlCol="0" anchor="ctr"/>
+          <a:p>
+            <a:pPr algn="ctr"/>
+            <a:endParaRPr lang="zh-CN" altLang="en-US"/>
+          </a:p>
+        </p:txBody>
+      </p:sp>
+      <p:sp>
+        <p:nvSpPr>
+          <p:cNvPr id="14" name="文本框 13"/>
+          <p:cNvSpPr txBox="1"/>
+          <p:nvPr/>
+        </p:nvSpPr>
+        <p:spPr>
+          <a:xfrm>
+            <a:off x="4769485" y="2766060"/>
+            <a:ext cx="1235710" cy="521970"/>
+          </a:xfrm>
+          <a:prstGeom prst="rect">
+            <a:avLst/>
+          </a:prstGeom>
+          <a:noFill/>
+        </p:spPr>
+        <p:txBody>
+          <a:bodyPr wrap="square" rtlCol="0">
+            <a:spAutoFit/>
+          </a:bodyPr>
+          <a:p>
+            <a:pPr algn="ctr"/>
+            <a:r>
+              <a:rPr lang="en-US" altLang="zh-CN" sz="1400"/>
+              <a:t>Database Buffer Cache</a:t>
+            </a:r>
+            <a:endParaRPr lang="en-US" altLang="zh-CN" sz="1400"/>
+          </a:p>
+        </p:txBody>
+      </p:sp>
+      <p:graphicFrame>
+        <p:nvGraphicFramePr>
+          <p:cNvPr id="15" name="表格 14"/>
+          <p:cNvGraphicFramePr/>
+          <p:nvPr>
+            <p:custDataLst>
+              <p:tags r:id="rId1"/>
+            </p:custDataLst>
+          </p:nvPr>
+        </p:nvGraphicFramePr>
+        <p:xfrm>
+          <a:off x="4863465" y="3920490"/>
+          <a:ext cx="1010920" cy="758825"/>
+        </p:xfrm>
+        <a:graphic>
+          <a:graphicData uri="http://schemas.openxmlformats.org/drawingml/2006/table">
+            <a:tbl>
+              <a:tblPr firstRow="1" bandRow="1">
+                <a:tableStyleId>{5C22544A-7EE6-4342-B048-85BDC9FD1C3A}</a:tableStyleId>
+              </a:tblPr>
+              <a:tblGrid>
+                <a:gridCol w="126365"/>
+                <a:gridCol w="126365"/>
+                <a:gridCol w="126365"/>
+                <a:gridCol w="44450"/>
+                <a:gridCol w="208280"/>
+                <a:gridCol w="126365"/>
+                <a:gridCol w="126365"/>
+                <a:gridCol w="126365"/>
+              </a:tblGrid>
+              <a:tr h="289560">
+                <a:tc>
+                  <a:txBody>
+                    <a:bodyPr/>
+                    <a:p>
+                      <a:pPr algn="ctr">
+                        <a:lnSpc>
+                          <a:spcPct val="120000"/>
+                        </a:lnSpc>
+                        <a:spcBef>
+                          <a:spcPts val="0"/>
+                        </a:spcBef>
+                        <a:spcAft>
+                          <a:spcPts val="0"/>
+                        </a:spcAft>
+                        <a:buNone/>
+                      </a:pPr>
+                      <a:endParaRPr lang="zh-CN" altLang="en-US" sz="300" spc="60">
+                        <a:solidFill>
+                          <a:srgbClr val="FFFFFF"/>
+                        </a:solidFill>
+                        <a:latin typeface="微软雅黑" panose="020B0503020204020204" pitchFamily="34" charset="-122"/>
+                        <a:ea typeface="微软雅黑" panose="020B0503020204020204" pitchFamily="34" charset="-122"/>
+                      </a:endParaRPr>
+                    </a:p>
+                  </a:txBody>
+                  <a:tcPr marL="12700" marR="12700" marT="12700" marB="12700" anchor="ctr">
+                    <a:lnL>
+                      <a:noFill/>
+                    </a:lnL>
+                    <a:lnR>
+                      <a:noFill/>
+                    </a:lnR>
+                    <a:lnT>
+                      <a:noFill/>
+                    </a:lnT>
+                    <a:lnB>
+                      <a:noFill/>
+                    </a:lnB>
+                    <a:solidFill>
+                      <a:srgbClr val="595959"/>
+                    </a:solidFill>
+                  </a:tcPr>
+                </a:tc>
+                <a:tc>
+                  <a:txBody>
+                    <a:bodyPr/>
+                    <a:p>
+                      <a:pPr algn="ctr">
+                        <a:lnSpc>
+                          <a:spcPct val="120000"/>
+                        </a:lnSpc>
+                        <a:spcBef>
+                          <a:spcPts val="0"/>
+                        </a:spcBef>
+                        <a:spcAft>
+                          <a:spcPts val="0"/>
+                        </a:spcAft>
+                        <a:buNone/>
+                      </a:pPr>
+                      <a:endParaRPr lang="zh-CN" altLang="en-US" sz="300" spc="60">
+                        <a:solidFill>
+                          <a:srgbClr val="FFFFFF"/>
+                        </a:solidFill>
+                        <a:latin typeface="微软雅黑" panose="020B0503020204020204" pitchFamily="34" charset="-122"/>
+                        <a:ea typeface="微软雅黑" panose="020B0503020204020204" pitchFamily="34" charset="-122"/>
+                      </a:endParaRPr>
+                    </a:p>
+                  </a:txBody>
+                  <a:tcPr marL="12700" marR="12700" marT="12700" marB="12700" anchor="ctr">
+                    <a:lnL>
+                      <a:noFill/>
+                    </a:lnL>
+                    <a:lnR>
+                      <a:noFill/>
+                    </a:lnR>
+                    <a:lnT>
+                      <a:noFill/>
+                    </a:lnT>
+                    <a:lnB>
+                      <a:noFill/>
+                    </a:lnB>
+                    <a:solidFill>
+                      <a:srgbClr val="F98638"/>
+                    </a:solidFill>
+                  </a:tcPr>
+                </a:tc>
+                <a:tc>
+                  <a:txBody>
+                    <a:bodyPr/>
+                    <a:p>
+                      <a:pPr algn="ctr">
+                        <a:lnSpc>
+                          <a:spcPct val="120000"/>
+                        </a:lnSpc>
+                        <a:spcBef>
+                          <a:spcPts val="0"/>
+                        </a:spcBef>
+                        <a:spcAft>
+                          <a:spcPts val="0"/>
+                        </a:spcAft>
+                        <a:buNone/>
+                      </a:pPr>
+                      <a:endParaRPr lang="zh-CN" altLang="en-US" sz="300" spc="60">
+                        <a:solidFill>
+                          <a:srgbClr val="FFFFFF"/>
+                        </a:solidFill>
+                        <a:latin typeface="微软雅黑" panose="020B0503020204020204" pitchFamily="34" charset="-122"/>
+                        <a:ea typeface="微软雅黑" panose="020B0503020204020204" pitchFamily="34" charset="-122"/>
+                      </a:endParaRPr>
+                    </a:p>
+                  </a:txBody>
+                  <a:tcPr marL="12700" marR="12700" marT="12700" marB="12700" anchor="ctr">
+                    <a:lnL>
+                      <a:noFill/>
+                    </a:lnL>
+                    <a:lnR>
+                      <a:noFill/>
+                    </a:lnR>
+                    <a:lnT>
+                      <a:noFill/>
+                    </a:lnT>
+                    <a:lnB>
+                      <a:noFill/>
+                    </a:lnB>
+                    <a:solidFill>
+                      <a:srgbClr val="FFB829"/>
+                    </a:solidFill>
+                  </a:tcPr>
+                </a:tc>
+                <a:tc>
+                  <a:txBody>
+                    <a:bodyPr/>
+                    <a:p>
+                      <a:pPr algn="ctr">
+                        <a:lnSpc>
+                          <a:spcPct val="120000"/>
+                        </a:lnSpc>
+                        <a:spcBef>
+                          <a:spcPts val="0"/>
+                        </a:spcBef>
+                        <a:spcAft>
+                          <a:spcPts val="0"/>
+                        </a:spcAft>
+                        <a:buNone/>
+                      </a:pPr>
+                      <a:endParaRPr lang="zh-CN" altLang="en-US" sz="300" spc="60">
+                        <a:solidFill>
+                          <a:srgbClr val="FFFFFF"/>
+                        </a:solidFill>
+                        <a:latin typeface="微软雅黑" panose="020B0503020204020204" pitchFamily="34" charset="-122"/>
+                        <a:ea typeface="微软雅黑" panose="020B0503020204020204" pitchFamily="34" charset="-122"/>
+                      </a:endParaRPr>
+                    </a:p>
+                  </a:txBody>
+                  <a:tcPr marL="12700" marR="12700" marT="12700" marB="12700" anchor="ctr">
+                    <a:lnL>
+                      <a:noFill/>
+                    </a:lnL>
+                    <a:lnR>
+                      <a:noFill/>
+                    </a:lnR>
+                    <a:lnT>
+                      <a:noFill/>
+                    </a:lnT>
+                    <a:lnB>
+                      <a:noFill/>
+                    </a:lnB>
+                    <a:solidFill>
+                      <a:srgbClr val="37BECC"/>
+                    </a:solidFill>
+                  </a:tcPr>
+                </a:tc>
+                <a:tc>
+                  <a:txBody>
+                    <a:bodyPr/>
+                    <a:p>
+                      <a:pPr algn="ctr">
+                        <a:lnSpc>
+                          <a:spcPct val="120000"/>
+                        </a:lnSpc>
+                        <a:spcBef>
+                          <a:spcPts val="0"/>
+                        </a:spcBef>
+                        <a:spcAft>
+                          <a:spcPts val="0"/>
+                        </a:spcAft>
+                        <a:buNone/>
+                      </a:pPr>
+                      <a:endParaRPr lang="zh-CN" altLang="en-US" sz="300" spc="60">
+                        <a:solidFill>
+                          <a:srgbClr val="FFFFFF"/>
+                        </a:solidFill>
+                        <a:latin typeface="微软雅黑" panose="020B0503020204020204" pitchFamily="34" charset="-122"/>
+                        <a:ea typeface="微软雅黑" panose="020B0503020204020204" pitchFamily="34" charset="-122"/>
+                      </a:endParaRPr>
+                    </a:p>
+                  </a:txBody>
+                  <a:tcPr marL="12700" marR="12700" marT="12700" marB="12700" anchor="ctr">
+                    <a:lnL>
+                      <a:noFill/>
+                    </a:lnL>
+                    <a:lnR>
+                      <a:noFill/>
+                    </a:lnR>
+                    <a:lnT>
+                      <a:noFill/>
+                    </a:lnT>
+                    <a:lnB>
+                      <a:noFill/>
+                    </a:lnB>
+                    <a:solidFill>
+                      <a:srgbClr val="1687A5"/>
+                    </a:solidFill>
+                  </a:tcPr>
+                </a:tc>
+                <a:tc>
+                  <a:txBody>
+                    <a:bodyPr/>
+                    <a:p>
+                      <a:pPr algn="ctr">
+                        <a:lnSpc>
+                          <a:spcPct val="120000"/>
+                        </a:lnSpc>
+                        <a:spcBef>
+                          <a:spcPts val="0"/>
+                        </a:spcBef>
+                        <a:spcAft>
+                          <a:spcPts val="0"/>
+                        </a:spcAft>
+                        <a:buNone/>
+                      </a:pPr>
+                      <a:endParaRPr lang="zh-CN" altLang="en-US" sz="300" spc="60">
+                        <a:solidFill>
+                          <a:srgbClr val="FFFFFF"/>
+                        </a:solidFill>
+                        <a:latin typeface="微软雅黑" panose="020B0503020204020204" pitchFamily="34" charset="-122"/>
+                        <a:ea typeface="微软雅黑" panose="020B0503020204020204" pitchFamily="34" charset="-122"/>
+                      </a:endParaRPr>
+                    </a:p>
+                  </a:txBody>
+                  <a:tcPr marL="12700" marR="12700" marT="12700" marB="12700" anchor="ctr">
+                    <a:lnL>
+                      <a:noFill/>
+                    </a:lnL>
+                    <a:lnR>
+                      <a:noFill/>
+                    </a:lnR>
+                    <a:lnT>
+                      <a:noFill/>
+                    </a:lnT>
+                    <a:lnB>
+                      <a:noFill/>
+                    </a:lnB>
+                    <a:solidFill>
+                      <a:srgbClr val="3A3A47"/>
+                    </a:solidFill>
+                  </a:tcPr>
+                </a:tc>
+                <a:tc>
+                  <a:txBody>
+                    <a:bodyPr/>
+                    <a:p>
+                      <a:pPr algn="ctr">
+                        <a:lnSpc>
+                          <a:spcPct val="120000"/>
+                        </a:lnSpc>
+                        <a:spcBef>
+                          <a:spcPts val="0"/>
+                        </a:spcBef>
+                        <a:spcAft>
+                          <a:spcPts val="0"/>
+                        </a:spcAft>
+                        <a:buNone/>
+                      </a:pPr>
+                      <a:endParaRPr lang="zh-CN" altLang="en-US" sz="300" spc="60">
+                        <a:solidFill>
+                          <a:srgbClr val="FFFFFF"/>
+                        </a:solidFill>
+                        <a:latin typeface="微软雅黑" panose="020B0503020204020204" pitchFamily="34" charset="-122"/>
+                        <a:ea typeface="微软雅黑" panose="020B0503020204020204" pitchFamily="34" charset="-122"/>
+                      </a:endParaRPr>
+                    </a:p>
+                  </a:txBody>
+                  <a:tcPr marL="12700" marR="12700" marT="12700" marB="12700" anchor="ctr">
+                    <a:lnL>
+                      <a:noFill/>
+                    </a:lnL>
+                    <a:lnR>
+                      <a:noFill/>
+                    </a:lnR>
+                    <a:lnT>
+                      <a:noFill/>
+                    </a:lnT>
+                    <a:lnB>
+                      <a:noFill/>
+                    </a:lnB>
+                    <a:solidFill>
+                      <a:srgbClr val="C7DADD"/>
+                    </a:solidFill>
+                  </a:tcPr>
+                </a:tc>
+                <a:tc>
+                  <a:txBody>
+                    <a:bodyPr/>
+                    <a:p>
+                      <a:pPr algn="ctr">
+                        <a:lnSpc>
+                          <a:spcPct val="120000"/>
+                        </a:lnSpc>
+                        <a:spcBef>
+                          <a:spcPts val="0"/>
+                        </a:spcBef>
+                        <a:spcAft>
+                          <a:spcPts val="0"/>
+                        </a:spcAft>
+                        <a:buNone/>
+                      </a:pPr>
+                      <a:endParaRPr lang="zh-CN" altLang="en-US" sz="300" spc="60">
+                        <a:solidFill>
+                          <a:srgbClr val="FFFFFF"/>
+                        </a:solidFill>
+                        <a:latin typeface="微软雅黑" panose="020B0503020204020204" pitchFamily="34" charset="-122"/>
+                        <a:ea typeface="微软雅黑" panose="020B0503020204020204" pitchFamily="34" charset="-122"/>
+                      </a:endParaRPr>
+                    </a:p>
+                  </a:txBody>
+                  <a:tcPr marL="12700" marR="12700" marT="12700" marB="12700" anchor="ctr">
+                    <a:lnL>
+                      <a:noFill/>
+                    </a:lnL>
+                    <a:lnR>
+                      <a:noFill/>
+                    </a:lnR>
+                    <a:lnT>
+                      <a:noFill/>
+                    </a:lnT>
+                    <a:lnB>
+                      <a:noFill/>
+                    </a:lnB>
+                    <a:solidFill>
+                      <a:srgbClr val="F98638"/>
+                    </a:solidFill>
+                  </a:tcPr>
+                </a:tc>
+              </a:tr>
+              <a:tr h="156845">
+                <a:tc>
+                  <a:txBody>
+                    <a:bodyPr/>
+                    <a:p>
+                      <a:pPr algn="ctr">
+                        <a:lnSpc>
+                          <a:spcPct val="120000"/>
+                        </a:lnSpc>
+                        <a:spcBef>
+                          <a:spcPts val="0"/>
+                        </a:spcBef>
+                        <a:spcAft>
+                          <a:spcPts val="0"/>
+                        </a:spcAft>
+                        <a:buNone/>
+                      </a:pPr>
+                      <a:endParaRPr lang="zh-CN" altLang="en-US" sz="100" spc="60">
+                        <a:solidFill>
+                          <a:srgbClr val="404040"/>
+                        </a:solidFill>
+                        <a:latin typeface="微软雅黑" panose="020B0503020204020204" pitchFamily="34" charset="-122"/>
+                        <a:ea typeface="微软雅黑" panose="020B0503020204020204" pitchFamily="34" charset="-122"/>
+                      </a:endParaRPr>
+                    </a:p>
+                  </a:txBody>
+                  <a:tcPr marL="12700" marR="12700" marT="12700" marB="12700" anchor="ctr">
+                    <a:lnL>
+                      <a:noFill/>
+                    </a:lnL>
+                    <a:lnR w="12700">
+                      <a:solidFill>
+                        <a:srgbClr val="D9D9D9"/>
+                      </a:solidFill>
+                      <a:prstDash val="solid"/>
+                    </a:lnR>
+                    <a:lnT>
+                      <a:noFill/>
+                    </a:lnT>
+                    <a:lnB>
+                      <a:noFill/>
+                    </a:lnB>
+                    <a:solidFill>
+                      <a:srgbClr val="FFFFFF"/>
+                    </a:solidFill>
+                  </a:tcPr>
+                </a:tc>
+                <a:tc>
+                  <a:txBody>
+                    <a:bodyPr/>
+                    <a:p>
+                      <a:pPr algn="ctr">
+                        <a:lnSpc>
+                          <a:spcPct val="120000"/>
+                        </a:lnSpc>
+                        <a:spcBef>
+                          <a:spcPts val="0"/>
+                        </a:spcBef>
+                        <a:spcAft>
+                          <a:spcPts val="0"/>
+                        </a:spcAft>
+                        <a:buNone/>
+                      </a:pPr>
+                      <a:endParaRPr lang="zh-CN" altLang="en-US" sz="100" spc="60">
+                        <a:solidFill>
+                          <a:srgbClr val="404040"/>
+                        </a:solidFill>
+                        <a:latin typeface="微软雅黑" panose="020B0503020204020204" pitchFamily="34" charset="-122"/>
+                        <a:ea typeface="微软雅黑" panose="020B0503020204020204" pitchFamily="34" charset="-122"/>
+                      </a:endParaRPr>
+                    </a:p>
+                  </a:txBody>
+                  <a:tcPr marL="12700" marR="12700" marT="12700" marB="12700" anchor="ctr">
+                    <a:lnL w="12700">
+                      <a:solidFill>
+                        <a:srgbClr val="D9D9D9"/>
+                      </a:solidFill>
+                      <a:prstDash val="solid"/>
+                    </a:lnL>
+                    <a:lnR w="6350">
+                      <a:solidFill>
+                        <a:srgbClr val="D9D9D9"/>
+                      </a:solidFill>
+                      <a:prstDash val="solid"/>
+                    </a:lnR>
+                    <a:lnT>
+                      <a:noFill/>
+                    </a:lnT>
+                    <a:lnB>
+                      <a:noFill/>
+                    </a:lnB>
+                    <a:solidFill>
+                      <a:srgbClr val="FFFFFF"/>
+                    </a:solidFill>
+                  </a:tcPr>
+                </a:tc>
+                <a:tc>
+                  <a:txBody>
+                    <a:bodyPr/>
+                    <a:p>
+                      <a:pPr algn="ctr">
+                        <a:lnSpc>
+                          <a:spcPct val="120000"/>
+                        </a:lnSpc>
+                        <a:spcBef>
+                          <a:spcPts val="0"/>
+                        </a:spcBef>
+                        <a:spcAft>
+                          <a:spcPts val="0"/>
+                        </a:spcAft>
+                        <a:buNone/>
+                      </a:pPr>
+                      <a:endParaRPr lang="zh-CN" altLang="en-US" sz="100" spc="60">
+                        <a:solidFill>
+                          <a:srgbClr val="404040"/>
+                        </a:solidFill>
+                        <a:latin typeface="微软雅黑" panose="020B0503020204020204" pitchFamily="34" charset="-122"/>
+                        <a:ea typeface="微软雅黑" panose="020B0503020204020204" pitchFamily="34" charset="-122"/>
+                      </a:endParaRPr>
+                    </a:p>
+                  </a:txBody>
+                  <a:tcPr marL="12700" marR="12700" marT="12700" marB="12700" anchor="ctr">
+                    <a:lnL w="6350">
+                      <a:solidFill>
+                        <a:srgbClr val="D9D9D9"/>
+                      </a:solidFill>
+                      <a:prstDash val="solid"/>
+                    </a:lnL>
+                    <a:lnR w="6350">
+                      <a:solidFill>
+                        <a:srgbClr val="D9D9D9"/>
+                      </a:solidFill>
+                      <a:prstDash val="solid"/>
+                    </a:lnR>
+                    <a:lnT>
+                      <a:noFill/>
+                    </a:lnT>
+                    <a:lnB>
+                      <a:noFill/>
+                    </a:lnB>
+                    <a:solidFill>
+                      <a:srgbClr val="FFFFFF"/>
+                    </a:solidFill>
+                  </a:tcPr>
+                </a:tc>
+                <a:tc>
+                  <a:txBody>
+                    <a:bodyPr/>
+                    <a:p>
+                      <a:pPr algn="ctr">
+                        <a:lnSpc>
+                          <a:spcPct val="120000"/>
+                        </a:lnSpc>
+                        <a:spcBef>
+                          <a:spcPts val="0"/>
+                        </a:spcBef>
+                        <a:spcAft>
+                          <a:spcPts val="0"/>
+                        </a:spcAft>
+                        <a:buNone/>
+                      </a:pPr>
+                      <a:endParaRPr lang="zh-CN" altLang="en-US" sz="100" spc="60">
+                        <a:solidFill>
+                          <a:srgbClr val="404040"/>
+                        </a:solidFill>
+                        <a:latin typeface="微软雅黑" panose="020B0503020204020204" pitchFamily="34" charset="-122"/>
+                        <a:ea typeface="微软雅黑" panose="020B0503020204020204" pitchFamily="34" charset="-122"/>
+                      </a:endParaRPr>
+                    </a:p>
+                  </a:txBody>
+                  <a:tcPr marL="12700" marR="12700" marT="12700" marB="12700" anchor="ctr">
+                    <a:lnL w="6350">
+                      <a:solidFill>
+                        <a:srgbClr val="D9D9D9"/>
+                      </a:solidFill>
+                      <a:prstDash val="solid"/>
+                    </a:lnL>
+                    <a:lnR w="6350">
+                      <a:solidFill>
+                        <a:srgbClr val="D9D9D9"/>
+                      </a:solidFill>
+                      <a:prstDash val="solid"/>
+                    </a:lnR>
+                    <a:lnT>
+                      <a:noFill/>
+                    </a:lnT>
+                    <a:lnB>
+                      <a:noFill/>
+                    </a:lnB>
+                    <a:solidFill>
+                      <a:srgbClr val="FFFFFF"/>
+                    </a:solidFill>
+                  </a:tcPr>
+                </a:tc>
+                <a:tc>
+                  <a:txBody>
+                    <a:bodyPr/>
+                    <a:p>
+                      <a:pPr algn="ctr">
+                        <a:lnSpc>
+                          <a:spcPct val="120000"/>
+                        </a:lnSpc>
+                        <a:spcBef>
+                          <a:spcPts val="0"/>
+                        </a:spcBef>
+                        <a:spcAft>
+                          <a:spcPts val="0"/>
+                        </a:spcAft>
+                        <a:buNone/>
+                      </a:pPr>
+                      <a:endParaRPr lang="zh-CN" altLang="en-US" sz="100" spc="60">
+                        <a:solidFill>
+                          <a:srgbClr val="404040"/>
+                        </a:solidFill>
+                        <a:latin typeface="微软雅黑" panose="020B0503020204020204" pitchFamily="34" charset="-122"/>
+                        <a:ea typeface="微软雅黑" panose="020B0503020204020204" pitchFamily="34" charset="-122"/>
+                      </a:endParaRPr>
+                    </a:p>
+                  </a:txBody>
+                  <a:tcPr marL="12700" marR="12700" marT="12700" marB="12700" anchor="ctr">
+                    <a:lnL w="6350">
+                      <a:solidFill>
+                        <a:srgbClr val="D9D9D9"/>
+                      </a:solidFill>
+                      <a:prstDash val="solid"/>
+                    </a:lnL>
+                    <a:lnR w="6350">
+                      <a:solidFill>
+                        <a:srgbClr val="D9D9D9"/>
+                      </a:solidFill>
+                      <a:prstDash val="solid"/>
+                    </a:lnR>
+                    <a:lnT>
+                      <a:noFill/>
+                    </a:lnT>
+                    <a:lnB>
+                      <a:noFill/>
+                    </a:lnB>
+                    <a:solidFill>
+                      <a:srgbClr val="FFFFFF"/>
+                    </a:solidFill>
+                  </a:tcPr>
+                </a:tc>
+                <a:tc>
+                  <a:txBody>
+                    <a:bodyPr/>
+                    <a:p>
+                      <a:pPr algn="ctr">
+                        <a:lnSpc>
+                          <a:spcPct val="120000"/>
+                        </a:lnSpc>
+                        <a:spcBef>
+                          <a:spcPts val="0"/>
+                        </a:spcBef>
+                        <a:spcAft>
+                          <a:spcPts val="0"/>
+                        </a:spcAft>
+                        <a:buNone/>
+                      </a:pPr>
+                      <a:endParaRPr lang="zh-CN" altLang="en-US" sz="100" spc="60">
+                        <a:solidFill>
+                          <a:srgbClr val="404040"/>
+                        </a:solidFill>
+                        <a:latin typeface="微软雅黑" panose="020B0503020204020204" pitchFamily="34" charset="-122"/>
+                        <a:ea typeface="微软雅黑" panose="020B0503020204020204" pitchFamily="34" charset="-122"/>
+                      </a:endParaRPr>
+                    </a:p>
+                  </a:txBody>
+                  <a:tcPr marL="12700" marR="12700" marT="12700" marB="12700" anchor="ctr">
+                    <a:lnL w="6350">
+                      <a:solidFill>
+                        <a:srgbClr val="D9D9D9"/>
+                      </a:solidFill>
+                      <a:prstDash val="solid"/>
+                    </a:lnL>
+                    <a:lnR w="6350">
+                      <a:solidFill>
+                        <a:srgbClr val="D9D9D9"/>
+                      </a:solidFill>
+                      <a:prstDash val="solid"/>
+                    </a:lnR>
+                    <a:lnT>
+                      <a:noFill/>
+                    </a:lnT>
+                    <a:lnB>
+                      <a:noFill/>
+                    </a:lnB>
+                    <a:solidFill>
+                      <a:srgbClr val="FFFFFF"/>
+                    </a:solidFill>
+                  </a:tcPr>
+                </a:tc>
+                <a:tc>
+                  <a:txBody>
+                    <a:bodyPr/>
+                    <a:p>
+                      <a:pPr algn="ctr">
+                        <a:lnSpc>
+                          <a:spcPct val="120000"/>
+                        </a:lnSpc>
+                        <a:spcBef>
+                          <a:spcPts val="0"/>
+                        </a:spcBef>
+                        <a:spcAft>
+                          <a:spcPts val="0"/>
+                        </a:spcAft>
+                        <a:buNone/>
+                      </a:pPr>
+                      <a:endParaRPr lang="zh-CN" altLang="en-US" sz="100" spc="60">
+                        <a:solidFill>
+                          <a:srgbClr val="404040"/>
+                        </a:solidFill>
+                        <a:latin typeface="微软雅黑" panose="020B0503020204020204" pitchFamily="34" charset="-122"/>
+                        <a:ea typeface="微软雅黑" panose="020B0503020204020204" pitchFamily="34" charset="-122"/>
+                      </a:endParaRPr>
+                    </a:p>
+                  </a:txBody>
+                  <a:tcPr marL="12700" marR="12700" marT="12700" marB="12700" anchor="ctr">
+                    <a:lnL w="6350">
+                      <a:solidFill>
+                        <a:srgbClr val="D9D9D9"/>
+                      </a:solidFill>
+                      <a:prstDash val="solid"/>
+                    </a:lnL>
+                    <a:lnR w="6350">
+                      <a:solidFill>
+                        <a:srgbClr val="D9D9D9"/>
+                      </a:solidFill>
+                      <a:prstDash val="solid"/>
+                    </a:lnR>
+                    <a:lnT>
+                      <a:noFill/>
+                    </a:lnT>
+                    <a:lnB>
+                      <a:noFill/>
+                    </a:lnB>
+                    <a:solidFill>
+                      <a:srgbClr val="FFFFFF"/>
+                    </a:solidFill>
+                  </a:tcPr>
+                </a:tc>
+                <a:tc>
+                  <a:txBody>
+                    <a:bodyPr/>
+                    <a:p>
+                      <a:pPr algn="ctr">
+                        <a:lnSpc>
+                          <a:spcPct val="120000"/>
+                        </a:lnSpc>
+                        <a:spcBef>
+                          <a:spcPts val="0"/>
+                        </a:spcBef>
+                        <a:spcAft>
+                          <a:spcPts val="0"/>
+                        </a:spcAft>
+                        <a:buNone/>
+                      </a:pPr>
+                      <a:endParaRPr lang="zh-CN" altLang="en-US" sz="100" spc="60">
+                        <a:solidFill>
+                          <a:srgbClr val="404040"/>
+                        </a:solidFill>
+                        <a:latin typeface="微软雅黑" panose="020B0503020204020204" pitchFamily="34" charset="-122"/>
+                        <a:ea typeface="微软雅黑" panose="020B0503020204020204" pitchFamily="34" charset="-122"/>
+                      </a:endParaRPr>
+                    </a:p>
+                  </a:txBody>
+                  <a:tcPr marL="12700" marR="12700" marT="12700" marB="12700" anchor="ctr">
+                    <a:lnL w="6350">
+                      <a:solidFill>
+                        <a:srgbClr val="D9D9D9"/>
+                      </a:solidFill>
+                      <a:prstDash val="solid"/>
+                    </a:lnL>
+                    <a:lnR>
+                      <a:noFill/>
+                    </a:lnR>
+                    <a:lnT>
+                      <a:noFill/>
+                    </a:lnT>
+                    <a:lnB>
+                      <a:noFill/>
+                    </a:lnB>
+                    <a:solidFill>
+                      <a:srgbClr val="FFFFFF"/>
+                    </a:solidFill>
+                  </a:tcPr>
+                </a:tc>
+              </a:tr>
+              <a:tr h="156210">
+                <a:tc>
+                  <a:txBody>
+                    <a:bodyPr/>
+                    <a:p>
+                      <a:pPr algn="ctr">
+                        <a:lnSpc>
+                          <a:spcPct val="120000"/>
+                        </a:lnSpc>
+                        <a:spcBef>
+                          <a:spcPts val="0"/>
+                        </a:spcBef>
+                        <a:spcAft>
+                          <a:spcPts val="0"/>
+                        </a:spcAft>
+                        <a:buNone/>
+                      </a:pPr>
+                      <a:endParaRPr lang="zh-CN" altLang="en-US" sz="100" spc="60">
+                        <a:solidFill>
+                          <a:srgbClr val="404040"/>
+                        </a:solidFill>
+                        <a:latin typeface="微软雅黑" panose="020B0503020204020204" pitchFamily="34" charset="-122"/>
+                        <a:ea typeface="微软雅黑" panose="020B0503020204020204" pitchFamily="34" charset="-122"/>
+                      </a:endParaRPr>
+                    </a:p>
+                  </a:txBody>
+                  <a:tcPr marL="12700" marR="12700" marT="12700" marB="12700" anchor="ctr">
+                    <a:lnL>
+                      <a:noFill/>
+                    </a:lnL>
+                    <a:lnR w="12700">
+                      <a:solidFill>
+                        <a:srgbClr val="D9D9D9"/>
+                      </a:solidFill>
+                      <a:prstDash val="solid"/>
+                    </a:lnR>
+                    <a:lnT>
+                      <a:noFill/>
+                    </a:lnT>
+                    <a:lnB>
+                      <a:noFill/>
+                    </a:lnB>
+                    <a:solidFill>
+                      <a:srgbClr val="F2F2F2"/>
+                    </a:solidFill>
+                  </a:tcPr>
+                </a:tc>
+                <a:tc>
+                  <a:txBody>
+                    <a:bodyPr/>
+                    <a:p>
+                      <a:pPr algn="ctr">
+                        <a:lnSpc>
+                          <a:spcPct val="120000"/>
+                        </a:lnSpc>
+                        <a:spcBef>
+                          <a:spcPts val="0"/>
+                        </a:spcBef>
+                        <a:spcAft>
+                          <a:spcPts val="0"/>
+                        </a:spcAft>
+                        <a:buNone/>
+                      </a:pPr>
+                      <a:endParaRPr lang="zh-CN" altLang="en-US" sz="100" spc="60">
+                        <a:solidFill>
+                          <a:srgbClr val="404040"/>
+                        </a:solidFill>
+                        <a:latin typeface="微软雅黑" panose="020B0503020204020204" pitchFamily="34" charset="-122"/>
+                        <a:ea typeface="微软雅黑" panose="020B0503020204020204" pitchFamily="34" charset="-122"/>
+                      </a:endParaRPr>
+                    </a:p>
+                  </a:txBody>
+                  <a:tcPr marL="12700" marR="12700" marT="12700" marB="12700" anchor="ctr">
+                    <a:lnL w="12700">
+                      <a:solidFill>
+                        <a:srgbClr val="D9D9D9"/>
+                      </a:solidFill>
+                      <a:prstDash val="solid"/>
+                    </a:lnL>
+                    <a:lnR w="6350">
+                      <a:solidFill>
+                        <a:srgbClr val="D9D9D9"/>
+                      </a:solidFill>
+                      <a:prstDash val="solid"/>
+                    </a:lnR>
+                    <a:lnT>
+                      <a:noFill/>
+                    </a:lnT>
+                    <a:lnB>
+                      <a:noFill/>
+                    </a:lnB>
+                    <a:solidFill>
+                      <a:srgbClr val="F2F2F2"/>
+                    </a:solidFill>
+                  </a:tcPr>
+                </a:tc>
+                <a:tc>
+                  <a:txBody>
+                    <a:bodyPr/>
+                    <a:p>
+                      <a:pPr algn="ctr">
+                        <a:lnSpc>
+                          <a:spcPct val="120000"/>
+                        </a:lnSpc>
+                        <a:spcBef>
+                          <a:spcPts val="0"/>
+                        </a:spcBef>
+                        <a:spcAft>
+                          <a:spcPts val="0"/>
+                        </a:spcAft>
+                        <a:buNone/>
+                      </a:pPr>
+                      <a:endParaRPr lang="zh-CN" altLang="en-US" sz="100" spc="60">
+                        <a:solidFill>
+                          <a:srgbClr val="404040"/>
+                        </a:solidFill>
+                        <a:latin typeface="微软雅黑" panose="020B0503020204020204" pitchFamily="34" charset="-122"/>
+                        <a:ea typeface="微软雅黑" panose="020B0503020204020204" pitchFamily="34" charset="-122"/>
+                      </a:endParaRPr>
+                    </a:p>
+                  </a:txBody>
+                  <a:tcPr marL="12700" marR="12700" marT="12700" marB="12700" anchor="ctr">
+                    <a:lnL w="6350">
+                      <a:solidFill>
+                        <a:srgbClr val="D9D9D9"/>
+                      </a:solidFill>
+                      <a:prstDash val="solid"/>
+                    </a:lnL>
+                    <a:lnR w="6350">
+                      <a:solidFill>
+                        <a:srgbClr val="D9D9D9"/>
+                      </a:solidFill>
+                      <a:prstDash val="solid"/>
+                    </a:lnR>
+                    <a:lnT>
+                      <a:noFill/>
+                    </a:lnT>
+                    <a:lnB>
+                      <a:noFill/>
+                    </a:lnB>
+                    <a:solidFill>
+                      <a:srgbClr val="F2F2F2"/>
+                    </a:solidFill>
+                  </a:tcPr>
+                </a:tc>
+                <a:tc>
+                  <a:txBody>
+                    <a:bodyPr/>
+                    <a:p>
+                      <a:pPr algn="ctr">
+                        <a:lnSpc>
+                          <a:spcPct val="120000"/>
+                        </a:lnSpc>
+                        <a:spcBef>
+                          <a:spcPts val="0"/>
+                        </a:spcBef>
+                        <a:spcAft>
+                          <a:spcPts val="0"/>
+                        </a:spcAft>
+                        <a:buNone/>
+                      </a:pPr>
+                      <a:endParaRPr lang="zh-CN" altLang="en-US" sz="100" spc="60">
+                        <a:solidFill>
+                          <a:srgbClr val="404040"/>
+                        </a:solidFill>
+                        <a:latin typeface="微软雅黑" panose="020B0503020204020204" pitchFamily="34" charset="-122"/>
+                        <a:ea typeface="微软雅黑" panose="020B0503020204020204" pitchFamily="34" charset="-122"/>
+                      </a:endParaRPr>
+                    </a:p>
+                  </a:txBody>
+                  <a:tcPr marL="12700" marR="12700" marT="12700" marB="12700" anchor="ctr">
+                    <a:lnL w="6350">
+                      <a:solidFill>
+                        <a:srgbClr val="D9D9D9"/>
+                      </a:solidFill>
+                      <a:prstDash val="solid"/>
+                    </a:lnL>
+                    <a:lnR w="6350">
+                      <a:solidFill>
+                        <a:srgbClr val="D9D9D9"/>
+                      </a:solidFill>
+                      <a:prstDash val="solid"/>
+                    </a:lnR>
+                    <a:lnT>
+                      <a:noFill/>
+                    </a:lnT>
+                    <a:lnB>
+                      <a:noFill/>
+                    </a:lnB>
+                    <a:solidFill>
+                      <a:srgbClr val="F2F2F2"/>
+                    </a:solidFill>
+                  </a:tcPr>
+                </a:tc>
+                <a:tc>
+                  <a:txBody>
+                    <a:bodyPr/>
+                    <a:p>
+                      <a:pPr algn="ctr">
+                        <a:lnSpc>
+                          <a:spcPct val="120000"/>
+                        </a:lnSpc>
+                        <a:spcBef>
+                          <a:spcPts val="0"/>
+                        </a:spcBef>
+                        <a:spcAft>
+                          <a:spcPts val="0"/>
+                        </a:spcAft>
+                        <a:buNone/>
+                      </a:pPr>
+                      <a:endParaRPr lang="zh-CN" altLang="en-US" sz="100" spc="60">
+                        <a:solidFill>
+                          <a:srgbClr val="404040"/>
+                        </a:solidFill>
+                        <a:latin typeface="微软雅黑" panose="020B0503020204020204" pitchFamily="34" charset="-122"/>
+                        <a:ea typeface="微软雅黑" panose="020B0503020204020204" pitchFamily="34" charset="-122"/>
+                      </a:endParaRPr>
+                    </a:p>
+                  </a:txBody>
+                  <a:tcPr marL="12700" marR="12700" marT="12700" marB="12700" anchor="ctr">
+                    <a:lnL w="6350">
+                      <a:solidFill>
+                        <a:srgbClr val="D9D9D9"/>
+                      </a:solidFill>
+                      <a:prstDash val="solid"/>
+                    </a:lnL>
+                    <a:lnR w="6350">
+                      <a:solidFill>
+                        <a:srgbClr val="D9D9D9"/>
+                      </a:solidFill>
+                      <a:prstDash val="solid"/>
+                    </a:lnR>
+                    <a:lnT>
+                      <a:noFill/>
+                    </a:lnT>
+                    <a:lnB>
+                      <a:noFill/>
+                    </a:lnB>
+                    <a:solidFill>
+                      <a:srgbClr val="F2F2F2"/>
+                    </a:solidFill>
+                  </a:tcPr>
+                </a:tc>
+                <a:tc>
+                  <a:txBody>
+                    <a:bodyPr/>
+                    <a:p>
+                      <a:pPr algn="ctr">
+                        <a:lnSpc>
+                          <a:spcPct val="120000"/>
+                        </a:lnSpc>
+                        <a:spcBef>
+                          <a:spcPts val="0"/>
+                        </a:spcBef>
+                        <a:spcAft>
+                          <a:spcPts val="0"/>
+                        </a:spcAft>
+                        <a:buNone/>
+                      </a:pPr>
+                      <a:endParaRPr lang="zh-CN" altLang="en-US" sz="100" spc="60">
+                        <a:solidFill>
+                          <a:srgbClr val="404040"/>
+                        </a:solidFill>
+                        <a:latin typeface="微软雅黑" panose="020B0503020204020204" pitchFamily="34" charset="-122"/>
+                        <a:ea typeface="微软雅黑" panose="020B0503020204020204" pitchFamily="34" charset="-122"/>
+                      </a:endParaRPr>
+                    </a:p>
+                  </a:txBody>
+                  <a:tcPr marL="12700" marR="12700" marT="12700" marB="12700" anchor="ctr">
+                    <a:lnL w="6350">
+                      <a:solidFill>
+                        <a:srgbClr val="D9D9D9"/>
+                      </a:solidFill>
+                      <a:prstDash val="solid"/>
+                    </a:lnL>
+                    <a:lnR w="6350">
+                      <a:solidFill>
+                        <a:srgbClr val="D9D9D9"/>
+                      </a:solidFill>
+                      <a:prstDash val="solid"/>
+                    </a:lnR>
+                    <a:lnT>
+                      <a:noFill/>
+                    </a:lnT>
+                    <a:lnB>
+                      <a:noFill/>
+                    </a:lnB>
+                    <a:solidFill>
+                      <a:srgbClr val="F2F2F2"/>
+                    </a:solidFill>
+                  </a:tcPr>
+                </a:tc>
+                <a:tc>
+                  <a:txBody>
+                    <a:bodyPr/>
+                    <a:p>
+                      <a:pPr algn="ctr">
+                        <a:lnSpc>
+                          <a:spcPct val="120000"/>
+                        </a:lnSpc>
+                        <a:spcBef>
+                          <a:spcPts val="0"/>
+                        </a:spcBef>
+                        <a:spcAft>
+                          <a:spcPts val="0"/>
+                        </a:spcAft>
+                        <a:buNone/>
+                      </a:pPr>
+                      <a:endParaRPr lang="zh-CN" altLang="en-US" sz="100" spc="60">
+                        <a:solidFill>
+                          <a:srgbClr val="404040"/>
+                        </a:solidFill>
+                        <a:latin typeface="微软雅黑" panose="020B0503020204020204" pitchFamily="34" charset="-122"/>
+                        <a:ea typeface="微软雅黑" panose="020B0503020204020204" pitchFamily="34" charset="-122"/>
+                      </a:endParaRPr>
+                    </a:p>
+                  </a:txBody>
+                  <a:tcPr marL="12700" marR="12700" marT="12700" marB="12700" anchor="ctr">
+                    <a:lnL w="6350">
+                      <a:solidFill>
+                        <a:srgbClr val="D9D9D9"/>
+                      </a:solidFill>
+                      <a:prstDash val="solid"/>
+                    </a:lnL>
+                    <a:lnR w="6350">
+                      <a:solidFill>
+                        <a:srgbClr val="D9D9D9"/>
+                      </a:solidFill>
+                      <a:prstDash val="solid"/>
+                    </a:lnR>
+                    <a:lnT>
+                      <a:noFill/>
+                    </a:lnT>
+                    <a:lnB>
+                      <a:noFill/>
+                    </a:lnB>
+                    <a:solidFill>
+                      <a:srgbClr val="F2F2F2"/>
+                    </a:solidFill>
+                  </a:tcPr>
+                </a:tc>
+                <a:tc>
+                  <a:txBody>
+                    <a:bodyPr/>
+                    <a:p>
+                      <a:pPr algn="ctr">
+                        <a:lnSpc>
+                          <a:spcPct val="120000"/>
+                        </a:lnSpc>
+                        <a:spcBef>
+                          <a:spcPts val="0"/>
+                        </a:spcBef>
+                        <a:spcAft>
+                          <a:spcPts val="0"/>
+                        </a:spcAft>
+                        <a:buNone/>
+                      </a:pPr>
+                      <a:endParaRPr lang="zh-CN" altLang="en-US" sz="100" spc="60">
+                        <a:solidFill>
+                          <a:srgbClr val="404040"/>
+                        </a:solidFill>
+                        <a:latin typeface="微软雅黑" panose="020B0503020204020204" pitchFamily="34" charset="-122"/>
+                        <a:ea typeface="微软雅黑" panose="020B0503020204020204" pitchFamily="34" charset="-122"/>
+                      </a:endParaRPr>
+                    </a:p>
+                  </a:txBody>
+                  <a:tcPr marL="12700" marR="12700" marT="12700" marB="12700" anchor="ctr">
+                    <a:lnL w="6350">
+                      <a:solidFill>
+                        <a:srgbClr val="D9D9D9"/>
+                      </a:solidFill>
+                      <a:prstDash val="solid"/>
+                    </a:lnL>
+                    <a:lnR>
+                      <a:noFill/>
+                    </a:lnR>
+                    <a:lnT>
+                      <a:noFill/>
+                    </a:lnT>
+                    <a:lnB>
+                      <a:noFill/>
+                    </a:lnB>
+                    <a:solidFill>
+                      <a:srgbClr val="F2F2F2"/>
+                    </a:solidFill>
+                  </a:tcPr>
+                </a:tc>
+              </a:tr>
+              <a:tr h="156210">
+                <a:tc>
+                  <a:txBody>
+                    <a:bodyPr/>
+                    <a:p>
+                      <a:pPr algn="ctr">
+                        <a:lnSpc>
+                          <a:spcPct val="120000"/>
+                        </a:lnSpc>
+                        <a:spcBef>
+                          <a:spcPts val="0"/>
+                        </a:spcBef>
+                        <a:spcAft>
+                          <a:spcPts val="0"/>
+                        </a:spcAft>
+                        <a:buNone/>
+                      </a:pPr>
+                      <a:endParaRPr lang="zh-CN" altLang="en-US" sz="100" spc="60">
+                        <a:solidFill>
+                          <a:srgbClr val="404040"/>
+                        </a:solidFill>
+                        <a:latin typeface="微软雅黑" panose="020B0503020204020204" pitchFamily="34" charset="-122"/>
+                        <a:ea typeface="微软雅黑" panose="020B0503020204020204" pitchFamily="34" charset="-122"/>
+                      </a:endParaRPr>
+                    </a:p>
+                  </a:txBody>
+                  <a:tcPr marL="12700" marR="12700" marT="12700" marB="12700" anchor="ctr">
+                    <a:lnL>
+                      <a:noFill/>
+                    </a:lnL>
+                    <a:lnR w="12700">
+                      <a:solidFill>
+                        <a:srgbClr val="D9D9D9"/>
+                      </a:solidFill>
+                      <a:prstDash val="solid"/>
+                    </a:lnR>
+                    <a:lnT>
+                      <a:noFill/>
+                    </a:lnT>
+                    <a:lnB w="19050">
+                      <a:solidFill>
+                        <a:srgbClr val="595959"/>
+                      </a:solidFill>
+                      <a:prstDash val="solid"/>
+                    </a:lnB>
+                    <a:solidFill>
+                      <a:srgbClr val="FFFFFF"/>
+                    </a:solidFill>
+                  </a:tcPr>
+                </a:tc>
+                <a:tc>
+                  <a:txBody>
+                    <a:bodyPr/>
+                    <a:p>
+                      <a:pPr algn="ctr">
+                        <a:lnSpc>
+                          <a:spcPct val="120000"/>
+                        </a:lnSpc>
+                        <a:spcBef>
+                          <a:spcPts val="0"/>
+                        </a:spcBef>
+                        <a:spcAft>
+                          <a:spcPts val="0"/>
+                        </a:spcAft>
+                        <a:buNone/>
+                      </a:pPr>
+                      <a:endParaRPr lang="zh-CN" altLang="en-US" sz="100" spc="60">
+                        <a:solidFill>
+                          <a:srgbClr val="404040"/>
+                        </a:solidFill>
+                        <a:latin typeface="微软雅黑" panose="020B0503020204020204" pitchFamily="34" charset="-122"/>
+                        <a:ea typeface="微软雅黑" panose="020B0503020204020204" pitchFamily="34" charset="-122"/>
+                      </a:endParaRPr>
+                    </a:p>
+                  </a:txBody>
+                  <a:tcPr marL="12700" marR="12700" marT="12700" marB="12700" anchor="ctr">
+                    <a:lnL w="12700">
+                      <a:solidFill>
+                        <a:srgbClr val="D9D9D9"/>
+                      </a:solidFill>
+                      <a:prstDash val="solid"/>
+                    </a:lnL>
+                    <a:lnR w="6350">
+                      <a:solidFill>
+                        <a:srgbClr val="D9D9D9"/>
+                      </a:solidFill>
+                      <a:prstDash val="solid"/>
+                    </a:lnR>
+                    <a:lnT>
+                      <a:noFill/>
+                    </a:lnT>
+                    <a:lnB w="19050">
+                      <a:solidFill>
+                        <a:srgbClr val="595959"/>
+                      </a:solidFill>
+                      <a:prstDash val="solid"/>
+                    </a:lnB>
+                    <a:solidFill>
+                      <a:srgbClr val="FFFFFF"/>
+                    </a:solidFill>
+                  </a:tcPr>
+                </a:tc>
+                <a:tc>
+                  <a:txBody>
+                    <a:bodyPr/>
+                    <a:p>
+                      <a:pPr algn="ctr">
+                        <a:lnSpc>
+                          <a:spcPct val="120000"/>
+                        </a:lnSpc>
+                        <a:spcBef>
+                          <a:spcPts val="0"/>
+                        </a:spcBef>
+                        <a:spcAft>
+                          <a:spcPts val="0"/>
+                        </a:spcAft>
+                        <a:buNone/>
+                      </a:pPr>
+                      <a:endParaRPr lang="zh-CN" altLang="en-US" sz="100" spc="60">
+                        <a:solidFill>
+                          <a:srgbClr val="404040"/>
+                        </a:solidFill>
+                        <a:latin typeface="微软雅黑" panose="020B0503020204020204" pitchFamily="34" charset="-122"/>
+                        <a:ea typeface="微软雅黑" panose="020B0503020204020204" pitchFamily="34" charset="-122"/>
+                      </a:endParaRPr>
+                    </a:p>
+                  </a:txBody>
+                  <a:tcPr marL="12700" marR="12700" marT="12700" marB="12700" anchor="ctr">
+                    <a:lnL w="6350">
+                      <a:solidFill>
+                        <a:srgbClr val="D9D9D9"/>
+                      </a:solidFill>
+                      <a:prstDash val="solid"/>
+                    </a:lnL>
+                    <a:lnR w="6350">
+                      <a:solidFill>
+                        <a:srgbClr val="D9D9D9"/>
+                      </a:solidFill>
+                      <a:prstDash val="solid"/>
+                    </a:lnR>
+                    <a:lnT>
+                      <a:noFill/>
+                    </a:lnT>
+                    <a:lnB w="19050">
+                      <a:solidFill>
+                        <a:srgbClr val="595959"/>
+                      </a:solidFill>
+                      <a:prstDash val="solid"/>
+                    </a:lnB>
+                    <a:solidFill>
+                      <a:srgbClr val="FFFFFF"/>
+                    </a:solidFill>
+                  </a:tcPr>
+                </a:tc>
+                <a:tc>
+                  <a:txBody>
+                    <a:bodyPr/>
+                    <a:p>
+                      <a:pPr algn="ctr">
+                        <a:lnSpc>
+                          <a:spcPct val="120000"/>
+                        </a:lnSpc>
+                        <a:spcBef>
+                          <a:spcPts val="0"/>
+                        </a:spcBef>
+                        <a:spcAft>
+                          <a:spcPts val="0"/>
+                        </a:spcAft>
+                        <a:buNone/>
+                      </a:pPr>
+                      <a:endParaRPr lang="zh-CN" altLang="en-US" sz="100" spc="60">
+                        <a:solidFill>
+                          <a:srgbClr val="404040"/>
+                        </a:solidFill>
+                        <a:latin typeface="微软雅黑" panose="020B0503020204020204" pitchFamily="34" charset="-122"/>
+                        <a:ea typeface="微软雅黑" panose="020B0503020204020204" pitchFamily="34" charset="-122"/>
+                      </a:endParaRPr>
+                    </a:p>
+                  </a:txBody>
+                  <a:tcPr marL="12700" marR="12700" marT="12700" marB="12700" anchor="ctr">
+                    <a:lnL w="6350">
+                      <a:solidFill>
+                        <a:srgbClr val="D9D9D9"/>
+                      </a:solidFill>
+                      <a:prstDash val="solid"/>
+                    </a:lnL>
+                    <a:lnR w="6350">
+                      <a:solidFill>
+                        <a:srgbClr val="D9D9D9"/>
+                      </a:solidFill>
+                      <a:prstDash val="solid"/>
+                    </a:lnR>
+                    <a:lnT>
+                      <a:noFill/>
+                    </a:lnT>
+                    <a:lnB w="19050">
+                      <a:solidFill>
+                        <a:srgbClr val="595959"/>
+                      </a:solidFill>
+                      <a:prstDash val="solid"/>
+                    </a:lnB>
+                    <a:solidFill>
+                      <a:srgbClr val="FFFFFF"/>
+                    </a:solidFill>
+                  </a:tcPr>
+                </a:tc>
+                <a:tc>
+                  <a:txBody>
+                    <a:bodyPr/>
+                    <a:p>
+                      <a:pPr algn="ctr">
+                        <a:lnSpc>
+                          <a:spcPct val="120000"/>
+                        </a:lnSpc>
+                        <a:spcBef>
+                          <a:spcPts val="0"/>
+                        </a:spcBef>
+                        <a:spcAft>
+                          <a:spcPts val="0"/>
+                        </a:spcAft>
+                        <a:buNone/>
+                      </a:pPr>
+                      <a:endParaRPr lang="zh-CN" altLang="en-US" sz="100" spc="60">
+                        <a:solidFill>
+                          <a:srgbClr val="404040"/>
+                        </a:solidFill>
+                        <a:latin typeface="微软雅黑" panose="020B0503020204020204" pitchFamily="34" charset="-122"/>
+                        <a:ea typeface="微软雅黑" panose="020B0503020204020204" pitchFamily="34" charset="-122"/>
+                      </a:endParaRPr>
+                    </a:p>
+                  </a:txBody>
+                  <a:tcPr marL="12700" marR="12700" marT="12700" marB="12700" anchor="ctr">
+                    <a:lnL w="6350">
+                      <a:solidFill>
+                        <a:srgbClr val="D9D9D9"/>
+                      </a:solidFill>
+                      <a:prstDash val="solid"/>
+                    </a:lnL>
+                    <a:lnR w="6350">
+                      <a:solidFill>
+                        <a:srgbClr val="D9D9D9"/>
+                      </a:solidFill>
+                      <a:prstDash val="solid"/>
+                    </a:lnR>
+                    <a:lnT>
+                      <a:noFill/>
+                    </a:lnT>
+                    <a:lnB w="19050">
+                      <a:solidFill>
+                        <a:srgbClr val="595959"/>
+                      </a:solidFill>
+                      <a:prstDash val="solid"/>
+                    </a:lnB>
+                    <a:solidFill>
+                      <a:srgbClr val="FFFFFF"/>
+                    </a:solidFill>
+                  </a:tcPr>
+                </a:tc>
+                <a:tc>
+                  <a:txBody>
+                    <a:bodyPr/>
+                    <a:p>
+                      <a:pPr algn="ctr">
+                        <a:lnSpc>
+                          <a:spcPct val="120000"/>
+                        </a:lnSpc>
+                        <a:spcBef>
+                          <a:spcPts val="0"/>
+                        </a:spcBef>
+                        <a:spcAft>
+                          <a:spcPts val="0"/>
+                        </a:spcAft>
+                        <a:buNone/>
+                      </a:pPr>
+                      <a:endParaRPr lang="zh-CN" altLang="en-US" sz="100" spc="60">
+                        <a:solidFill>
+                          <a:srgbClr val="404040"/>
+                        </a:solidFill>
+                        <a:latin typeface="微软雅黑" panose="020B0503020204020204" pitchFamily="34" charset="-122"/>
+                        <a:ea typeface="微软雅黑" panose="020B0503020204020204" pitchFamily="34" charset="-122"/>
+                      </a:endParaRPr>
+                    </a:p>
+                  </a:txBody>
+                  <a:tcPr marL="12700" marR="12700" marT="12700" marB="12700" anchor="ctr">
+                    <a:lnL w="6350">
+                      <a:solidFill>
+                        <a:srgbClr val="D9D9D9"/>
+                      </a:solidFill>
+                      <a:prstDash val="solid"/>
+                    </a:lnL>
+                    <a:lnR w="6350">
+                      <a:solidFill>
+                        <a:srgbClr val="D9D9D9"/>
+                      </a:solidFill>
+                      <a:prstDash val="solid"/>
+                    </a:lnR>
+                    <a:lnT>
+                      <a:noFill/>
+                    </a:lnT>
+                    <a:lnB w="19050">
+                      <a:solidFill>
+                        <a:srgbClr val="595959"/>
+                      </a:solidFill>
+                      <a:prstDash val="solid"/>
+                    </a:lnB>
+                    <a:solidFill>
+                      <a:srgbClr val="FFFFFF"/>
+                    </a:solidFill>
+                  </a:tcPr>
+                </a:tc>
+                <a:tc>
+                  <a:txBody>
+                    <a:bodyPr/>
+                    <a:p>
+                      <a:pPr algn="ctr">
+                        <a:lnSpc>
+                          <a:spcPct val="120000"/>
+                        </a:lnSpc>
+                        <a:spcBef>
+                          <a:spcPts val="0"/>
+                        </a:spcBef>
+                        <a:spcAft>
+                          <a:spcPts val="0"/>
+                        </a:spcAft>
+                        <a:buNone/>
+                      </a:pPr>
+                      <a:endParaRPr lang="zh-CN" altLang="en-US" sz="100" spc="60">
+                        <a:solidFill>
+                          <a:srgbClr val="404040"/>
+                        </a:solidFill>
+                        <a:latin typeface="微软雅黑" panose="020B0503020204020204" pitchFamily="34" charset="-122"/>
+                        <a:ea typeface="微软雅黑" panose="020B0503020204020204" pitchFamily="34" charset="-122"/>
+                      </a:endParaRPr>
+                    </a:p>
+                  </a:txBody>
+                  <a:tcPr marL="12700" marR="12700" marT="12700" marB="12700" anchor="ctr">
+                    <a:lnL w="6350">
+                      <a:solidFill>
+                        <a:srgbClr val="D9D9D9"/>
+                      </a:solidFill>
+                      <a:prstDash val="solid"/>
+                    </a:lnL>
+                    <a:lnR w="6350">
+                      <a:solidFill>
+                        <a:srgbClr val="D9D9D9"/>
+                      </a:solidFill>
+                      <a:prstDash val="solid"/>
+                    </a:lnR>
+                    <a:lnT>
+                      <a:noFill/>
+                    </a:lnT>
+                    <a:lnB w="19050">
+                      <a:solidFill>
+                        <a:srgbClr val="595959"/>
+                      </a:solidFill>
+                      <a:prstDash val="solid"/>
+                    </a:lnB>
+                    <a:solidFill>
+                      <a:srgbClr val="FFFFFF"/>
+                    </a:solidFill>
+                  </a:tcPr>
+                </a:tc>
+                <a:tc>
+                  <a:txBody>
+                    <a:bodyPr/>
+                    <a:p>
+                      <a:pPr algn="ctr">
+                        <a:lnSpc>
+                          <a:spcPct val="120000"/>
+                        </a:lnSpc>
+                        <a:spcBef>
+                          <a:spcPts val="0"/>
+                        </a:spcBef>
+                        <a:spcAft>
+                          <a:spcPts val="0"/>
+                        </a:spcAft>
+                        <a:buNone/>
+                      </a:pPr>
+                      <a:endParaRPr lang="zh-CN" altLang="en-US" sz="100" spc="60">
+                        <a:solidFill>
+                          <a:srgbClr val="404040"/>
+                        </a:solidFill>
+                        <a:latin typeface="微软雅黑" panose="020B0503020204020204" pitchFamily="34" charset="-122"/>
+                        <a:ea typeface="微软雅黑" panose="020B0503020204020204" pitchFamily="34" charset="-122"/>
+                      </a:endParaRPr>
+                    </a:p>
+                  </a:txBody>
+                  <a:tcPr marL="12700" marR="12700" marT="12700" marB="12700" anchor="ctr">
+                    <a:lnL w="6350">
+                      <a:solidFill>
+                        <a:srgbClr val="D9D9D9"/>
+                      </a:solidFill>
+                      <a:prstDash val="solid"/>
+                    </a:lnL>
+                    <a:lnR>
+                      <a:noFill/>
+                    </a:lnR>
+                    <a:lnT>
+                      <a:noFill/>
+                    </a:lnT>
+                    <a:lnB w="19050">
+                      <a:solidFill>
+                        <a:srgbClr val="595959"/>
+                      </a:solidFill>
+                      <a:prstDash val="solid"/>
+                    </a:lnB>
+                    <a:solidFill>
+                      <a:srgbClr val="FFFFFF"/>
+                    </a:solidFill>
+                  </a:tcPr>
+                </a:tc>
+              </a:tr>
+            </a:tbl>
+          </a:graphicData>
+        </a:graphic>
+      </p:graphicFrame>
+      <p:graphicFrame>
+        <p:nvGraphicFramePr>
+          <p:cNvPr id="17" name="表格 16"/>
+          <p:cNvGraphicFramePr/>
+          <p:nvPr>
+            <p:custDataLst>
+              <p:tags r:id="rId2"/>
+            </p:custDataLst>
+          </p:nvPr>
+        </p:nvGraphicFramePr>
+        <p:xfrm>
+          <a:off x="4774565" y="3308350"/>
+          <a:ext cx="1234440" cy="533400"/>
+        </p:xfrm>
+        <a:graphic>
+          <a:graphicData uri="http://schemas.openxmlformats.org/drawingml/2006/table">
+            <a:tbl>
+              <a:tblPr firstRow="1" bandRow="1">
+                <a:tableStyleId>{5C22544A-7EE6-4342-B048-85BDC9FD1C3A}</a:tableStyleId>
+              </a:tblPr>
+              <a:tblGrid>
+                <a:gridCol w="154305"/>
+                <a:gridCol w="154305"/>
+                <a:gridCol w="154305"/>
+                <a:gridCol w="154305"/>
+                <a:gridCol w="154305"/>
+                <a:gridCol w="154305"/>
+                <a:gridCol w="154305"/>
+                <a:gridCol w="154305"/>
+              </a:tblGrid>
+              <a:tr h="346710">
+                <a:tc>
+                  <a:txBody>
+                    <a:bodyPr/>
+                    <a:p>
+                      <a:pPr algn="ctr">
+                        <a:lnSpc>
+                          <a:spcPct val="120000"/>
+                        </a:lnSpc>
+                        <a:spcBef>
+                          <a:spcPts val="0"/>
+                        </a:spcBef>
+                        <a:spcAft>
+                          <a:spcPts val="0"/>
+                        </a:spcAft>
+                        <a:buNone/>
+                      </a:pPr>
+                      <a:endParaRPr lang="zh-CN" altLang="en-US" sz="300" spc="60">
+                        <a:solidFill>
+                          <a:srgbClr val="FFFFFF"/>
+                        </a:solidFill>
+                        <a:latin typeface="微软雅黑" panose="020B0503020204020204" pitchFamily="34" charset="-122"/>
+                        <a:ea typeface="微软雅黑" panose="020B0503020204020204" pitchFamily="34" charset="-122"/>
+                      </a:endParaRPr>
+                    </a:p>
+                  </a:txBody>
+                  <a:tcPr marL="12700" marR="12700" marT="12700" marB="12700" anchor="ctr">
+                    <a:lnL>
+                      <a:noFill/>
+                    </a:lnL>
+                    <a:lnR>
+                      <a:noFill/>
+                    </a:lnR>
+                    <a:lnT>
+                      <a:noFill/>
+                    </a:lnT>
+                    <a:lnB>
+                      <a:noFill/>
+                    </a:lnB>
+                    <a:solidFill>
+                      <a:srgbClr val="595959"/>
+                    </a:solidFill>
+                  </a:tcPr>
+                </a:tc>
+                <a:tc>
+                  <a:txBody>
+                    <a:bodyPr/>
+                    <a:p>
+                      <a:pPr algn="ctr">
+                        <a:lnSpc>
+                          <a:spcPct val="120000"/>
+                        </a:lnSpc>
+                        <a:spcBef>
+                          <a:spcPts val="0"/>
+                        </a:spcBef>
+                        <a:spcAft>
+                          <a:spcPts val="0"/>
+                        </a:spcAft>
+                        <a:buNone/>
+                      </a:pPr>
+                      <a:endParaRPr lang="zh-CN" altLang="en-US" sz="300" spc="60">
+                        <a:solidFill>
+                          <a:srgbClr val="FFFFFF"/>
+                        </a:solidFill>
+                        <a:latin typeface="微软雅黑" panose="020B0503020204020204" pitchFamily="34" charset="-122"/>
+                        <a:ea typeface="微软雅黑" panose="020B0503020204020204" pitchFamily="34" charset="-122"/>
+                      </a:endParaRPr>
+                    </a:p>
+                  </a:txBody>
+                  <a:tcPr marL="12700" marR="12700" marT="12700" marB="12700" anchor="ctr">
+                    <a:lnL>
+                      <a:noFill/>
+                    </a:lnL>
+                    <a:lnR>
+                      <a:noFill/>
+                    </a:lnR>
+                    <a:lnT>
+                      <a:noFill/>
+                    </a:lnT>
+                    <a:lnB>
+                      <a:noFill/>
+                    </a:lnB>
+                    <a:solidFill>
+                      <a:srgbClr val="FFA79D"/>
+                    </a:solidFill>
+                  </a:tcPr>
+                </a:tc>
+                <a:tc>
+                  <a:txBody>
+                    <a:bodyPr/>
+                    <a:p>
+                      <a:pPr algn="ctr">
+                        <a:lnSpc>
+                          <a:spcPct val="120000"/>
+                        </a:lnSpc>
+                        <a:spcBef>
+                          <a:spcPts val="0"/>
+                        </a:spcBef>
+                        <a:spcAft>
+                          <a:spcPts val="0"/>
+                        </a:spcAft>
+                        <a:buNone/>
+                      </a:pPr>
+                      <a:endParaRPr lang="zh-CN" altLang="en-US" sz="300" spc="60">
+                        <a:solidFill>
+                          <a:srgbClr val="FFFFFF"/>
+                        </a:solidFill>
+                        <a:latin typeface="微软雅黑" panose="020B0503020204020204" pitchFamily="34" charset="-122"/>
+                        <a:ea typeface="微软雅黑" panose="020B0503020204020204" pitchFamily="34" charset="-122"/>
+                      </a:endParaRPr>
+                    </a:p>
+                  </a:txBody>
+                  <a:tcPr marL="12700" marR="12700" marT="12700" marB="12700" anchor="ctr">
+                    <a:lnL>
+                      <a:noFill/>
+                    </a:lnL>
+                    <a:lnR>
+                      <a:noFill/>
+                    </a:lnR>
+                    <a:lnT>
+                      <a:noFill/>
+                    </a:lnT>
+                    <a:lnB>
+                      <a:noFill/>
+                    </a:lnB>
+                    <a:solidFill>
+                      <a:srgbClr val="FED585"/>
+                    </a:solidFill>
+                  </a:tcPr>
+                </a:tc>
+                <a:tc>
+                  <a:txBody>
+                    <a:bodyPr/>
+                    <a:p>
+                      <a:pPr algn="ctr">
+                        <a:lnSpc>
+                          <a:spcPct val="120000"/>
+                        </a:lnSpc>
+                        <a:spcBef>
+                          <a:spcPts val="0"/>
+                        </a:spcBef>
+                        <a:spcAft>
+                          <a:spcPts val="0"/>
+                        </a:spcAft>
+                        <a:buNone/>
+                      </a:pPr>
+                      <a:endParaRPr lang="zh-CN" altLang="en-US" sz="300" spc="60">
+                        <a:solidFill>
+                          <a:srgbClr val="FFFFFF"/>
+                        </a:solidFill>
+                        <a:latin typeface="微软雅黑" panose="020B0503020204020204" pitchFamily="34" charset="-122"/>
+                        <a:ea typeface="微软雅黑" panose="020B0503020204020204" pitchFamily="34" charset="-122"/>
+                      </a:endParaRPr>
+                    </a:p>
+                  </a:txBody>
+                  <a:tcPr marL="12700" marR="12700" marT="12700" marB="12700" anchor="ctr">
+                    <a:lnL>
+                      <a:noFill/>
+                    </a:lnL>
+                    <a:lnR>
+                      <a:noFill/>
+                    </a:lnR>
+                    <a:lnT>
+                      <a:noFill/>
+                    </a:lnT>
+                    <a:lnB>
+                      <a:noFill/>
+                    </a:lnB>
+                    <a:solidFill>
+                      <a:srgbClr val="FEF284"/>
+                    </a:solidFill>
+                  </a:tcPr>
+                </a:tc>
+                <a:tc>
+                  <a:txBody>
+                    <a:bodyPr/>
+                    <a:p>
+                      <a:pPr algn="ctr">
+                        <a:lnSpc>
+                          <a:spcPct val="120000"/>
+                        </a:lnSpc>
+                        <a:spcBef>
+                          <a:spcPts val="0"/>
+                        </a:spcBef>
+                        <a:spcAft>
+                          <a:spcPts val="0"/>
+                        </a:spcAft>
+                        <a:buNone/>
+                      </a:pPr>
+                      <a:endParaRPr lang="zh-CN" altLang="en-US" sz="300" spc="60">
+                        <a:solidFill>
+                          <a:srgbClr val="FFFFFF"/>
+                        </a:solidFill>
+                        <a:latin typeface="微软雅黑" panose="020B0503020204020204" pitchFamily="34" charset="-122"/>
+                        <a:ea typeface="微软雅黑" panose="020B0503020204020204" pitchFamily="34" charset="-122"/>
+                      </a:endParaRPr>
+                    </a:p>
+                  </a:txBody>
+                  <a:tcPr marL="12700" marR="12700" marT="12700" marB="12700" anchor="ctr">
+                    <a:lnL>
+                      <a:noFill/>
+                    </a:lnL>
+                    <a:lnR>
+                      <a:noFill/>
+                    </a:lnR>
+                    <a:lnT>
+                      <a:noFill/>
+                    </a:lnT>
+                    <a:lnB>
+                      <a:noFill/>
+                    </a:lnB>
+                    <a:solidFill>
+                      <a:srgbClr val="C3E29E"/>
+                    </a:solidFill>
+                  </a:tcPr>
+                </a:tc>
+                <a:tc>
+                  <a:txBody>
+                    <a:bodyPr/>
+                    <a:p>
+                      <a:pPr algn="ctr">
+                        <a:lnSpc>
+                          <a:spcPct val="120000"/>
+                        </a:lnSpc>
+                        <a:spcBef>
+                          <a:spcPts val="0"/>
+                        </a:spcBef>
+                        <a:spcAft>
+                          <a:spcPts val="0"/>
+                        </a:spcAft>
+                        <a:buNone/>
+                      </a:pPr>
+                      <a:endParaRPr lang="zh-CN" altLang="en-US" sz="300" spc="60">
+                        <a:solidFill>
+                          <a:srgbClr val="FFFFFF"/>
+                        </a:solidFill>
+                        <a:latin typeface="微软雅黑" panose="020B0503020204020204" pitchFamily="34" charset="-122"/>
+                        <a:ea typeface="微软雅黑" panose="020B0503020204020204" pitchFamily="34" charset="-122"/>
+                      </a:endParaRPr>
+                    </a:p>
+                  </a:txBody>
+                  <a:tcPr marL="12700" marR="12700" marT="12700" marB="12700" anchor="ctr">
+                    <a:lnL>
+                      <a:noFill/>
+                    </a:lnL>
+                    <a:lnR>
+                      <a:noFill/>
+                    </a:lnR>
+                    <a:lnT>
+                      <a:noFill/>
+                    </a:lnT>
+                    <a:lnB>
+                      <a:noFill/>
+                    </a:lnB>
+                    <a:solidFill>
+                      <a:srgbClr val="ABE9FE"/>
+                    </a:solidFill>
+                  </a:tcPr>
+                </a:tc>
+                <a:tc>
+                  <a:txBody>
+                    <a:bodyPr/>
+                    <a:p>
+                      <a:pPr algn="ctr">
+                        <a:lnSpc>
+                          <a:spcPct val="120000"/>
+                        </a:lnSpc>
+                        <a:spcBef>
+                          <a:spcPts val="0"/>
+                        </a:spcBef>
+                        <a:spcAft>
+                          <a:spcPts val="0"/>
+                        </a:spcAft>
+                        <a:buNone/>
+                      </a:pPr>
+                      <a:endParaRPr lang="zh-CN" altLang="en-US" sz="300" spc="60">
+                        <a:solidFill>
+                          <a:srgbClr val="FFFFFF"/>
+                        </a:solidFill>
+                        <a:latin typeface="微软雅黑" panose="020B0503020204020204" pitchFamily="34" charset="-122"/>
+                        <a:ea typeface="微软雅黑" panose="020B0503020204020204" pitchFamily="34" charset="-122"/>
+                      </a:endParaRPr>
+                    </a:p>
+                  </a:txBody>
+                  <a:tcPr marL="12700" marR="12700" marT="12700" marB="12700" anchor="ctr">
+                    <a:lnL>
+                      <a:noFill/>
+                    </a:lnL>
+                    <a:lnR>
+                      <a:noFill/>
+                    </a:lnR>
+                    <a:lnT>
+                      <a:noFill/>
+                    </a:lnT>
+                    <a:lnB>
+                      <a:noFill/>
+                    </a:lnB>
+                    <a:solidFill>
+                      <a:srgbClr val="96AFEF"/>
+                    </a:solidFill>
+                  </a:tcPr>
+                </a:tc>
+                <a:tc>
+                  <a:txBody>
+                    <a:bodyPr/>
+                    <a:p>
+                      <a:pPr algn="ctr">
+                        <a:lnSpc>
+                          <a:spcPct val="120000"/>
+                        </a:lnSpc>
+                        <a:spcBef>
+                          <a:spcPts val="0"/>
+                        </a:spcBef>
+                        <a:spcAft>
+                          <a:spcPts val="0"/>
+                        </a:spcAft>
+                        <a:buNone/>
+                      </a:pPr>
+                      <a:endParaRPr lang="zh-CN" altLang="en-US" sz="300" spc="60">
+                        <a:solidFill>
+                          <a:srgbClr val="FFFFFF"/>
+                        </a:solidFill>
+                        <a:latin typeface="微软雅黑" panose="020B0503020204020204" pitchFamily="34" charset="-122"/>
+                        <a:ea typeface="微软雅黑" panose="020B0503020204020204" pitchFamily="34" charset="-122"/>
+                      </a:endParaRPr>
+                    </a:p>
+                  </a:txBody>
+                  <a:tcPr marL="12700" marR="12700" marT="12700" marB="12700" anchor="ctr">
+                    <a:lnL>
+                      <a:noFill/>
+                    </a:lnL>
+                    <a:lnR>
+                      <a:noFill/>
+                    </a:lnR>
+                    <a:lnT>
+                      <a:noFill/>
+                    </a:lnT>
+                    <a:lnB>
+                      <a:noFill/>
+                    </a:lnB>
+                    <a:solidFill>
+                      <a:srgbClr val="FFA79D"/>
+                    </a:solidFill>
+                  </a:tcPr>
+                </a:tc>
+              </a:tr>
+              <a:tr h="186690">
+                <a:tc>
+                  <a:txBody>
+                    <a:bodyPr/>
+                    <a:p>
+                      <a:pPr algn="ctr">
+                        <a:lnSpc>
+                          <a:spcPct val="120000"/>
+                        </a:lnSpc>
+                        <a:spcBef>
+                          <a:spcPts val="0"/>
+                        </a:spcBef>
+                        <a:spcAft>
+                          <a:spcPts val="0"/>
+                        </a:spcAft>
+                        <a:buNone/>
+                      </a:pPr>
+                      <a:endParaRPr lang="zh-CN" altLang="en-US" sz="100" spc="60">
+                        <a:solidFill>
+                          <a:srgbClr val="404040"/>
+                        </a:solidFill>
+                        <a:latin typeface="微软雅黑" panose="020B0503020204020204" pitchFamily="34" charset="-122"/>
+                        <a:ea typeface="微软雅黑" panose="020B0503020204020204" pitchFamily="34" charset="-122"/>
+                      </a:endParaRPr>
+                    </a:p>
+                  </a:txBody>
+                  <a:tcPr marL="12700" marR="12700" marT="12700" marB="12700" anchor="ctr">
+                    <a:lnL>
+                      <a:noFill/>
+                    </a:lnL>
+                    <a:lnR w="12700">
+                      <a:solidFill>
+                        <a:srgbClr val="D9D9D9"/>
+                      </a:solidFill>
+                      <a:prstDash val="solid"/>
+                    </a:lnR>
+                    <a:lnT>
+                      <a:noFill/>
+                    </a:lnT>
+                    <a:lnB w="19050">
+                      <a:solidFill>
+                        <a:srgbClr val="595959"/>
+                      </a:solidFill>
+                      <a:prstDash val="solid"/>
+                    </a:lnB>
+                    <a:solidFill>
+                      <a:srgbClr val="FFFFFF"/>
+                    </a:solidFill>
+                  </a:tcPr>
+                </a:tc>
+                <a:tc>
+                  <a:txBody>
+                    <a:bodyPr/>
+                    <a:p>
+                      <a:pPr algn="ctr">
+                        <a:lnSpc>
+                          <a:spcPct val="120000"/>
+                        </a:lnSpc>
+                        <a:spcBef>
+                          <a:spcPts val="0"/>
+                        </a:spcBef>
+                        <a:spcAft>
+                          <a:spcPts val="0"/>
+                        </a:spcAft>
+                        <a:buNone/>
+                      </a:pPr>
+                      <a:endParaRPr lang="zh-CN" altLang="en-US" sz="100" spc="60">
+                        <a:solidFill>
+                          <a:srgbClr val="404040"/>
+                        </a:solidFill>
+                        <a:latin typeface="微软雅黑" panose="020B0503020204020204" pitchFamily="34" charset="-122"/>
+                        <a:ea typeface="微软雅黑" panose="020B0503020204020204" pitchFamily="34" charset="-122"/>
+                      </a:endParaRPr>
+                    </a:p>
+                  </a:txBody>
+                  <a:tcPr marL="12700" marR="12700" marT="12700" marB="12700" anchor="ctr">
+                    <a:lnL w="12700">
+                      <a:solidFill>
+                        <a:srgbClr val="D9D9D9"/>
+                      </a:solidFill>
+                      <a:prstDash val="solid"/>
+                    </a:lnL>
+                    <a:lnR w="6350">
+                      <a:solidFill>
+                        <a:srgbClr val="D9D9D9"/>
+                      </a:solidFill>
+                      <a:prstDash val="solid"/>
+                    </a:lnR>
+                    <a:lnT>
+                      <a:noFill/>
+                    </a:lnT>
+                    <a:lnB w="19050">
+                      <a:solidFill>
+                        <a:srgbClr val="595959"/>
+                      </a:solidFill>
+                      <a:prstDash val="solid"/>
+                    </a:lnB>
+                    <a:solidFill>
+                      <a:srgbClr val="FFFFFF"/>
+                    </a:solidFill>
+                  </a:tcPr>
+                </a:tc>
+                <a:tc>
+                  <a:txBody>
+                    <a:bodyPr/>
+                    <a:p>
+                      <a:pPr algn="ctr">
+                        <a:lnSpc>
+                          <a:spcPct val="120000"/>
+                        </a:lnSpc>
+                        <a:spcBef>
+                          <a:spcPts val="0"/>
+                        </a:spcBef>
+                        <a:spcAft>
+                          <a:spcPts val="0"/>
+                        </a:spcAft>
+                        <a:buNone/>
+                      </a:pPr>
+                      <a:endParaRPr lang="zh-CN" altLang="en-US" sz="100" spc="60">
+                        <a:solidFill>
+                          <a:srgbClr val="404040"/>
+                        </a:solidFill>
+                        <a:latin typeface="微软雅黑" panose="020B0503020204020204" pitchFamily="34" charset="-122"/>
+                        <a:ea typeface="微软雅黑" panose="020B0503020204020204" pitchFamily="34" charset="-122"/>
+                      </a:endParaRPr>
+                    </a:p>
+                  </a:txBody>
+                  <a:tcPr marL="12700" marR="12700" marT="12700" marB="12700" anchor="ctr">
+                    <a:lnL w="6350">
+                      <a:solidFill>
+                        <a:srgbClr val="D9D9D9"/>
+                      </a:solidFill>
+                      <a:prstDash val="solid"/>
+                    </a:lnL>
+                    <a:lnR w="6350">
+                      <a:solidFill>
+                        <a:srgbClr val="D9D9D9"/>
+                      </a:solidFill>
+                      <a:prstDash val="solid"/>
+                    </a:lnR>
+                    <a:lnT>
+                      <a:noFill/>
+                    </a:lnT>
+                    <a:lnB w="19050">
+                      <a:solidFill>
+                        <a:srgbClr val="595959"/>
+                      </a:solidFill>
+                      <a:prstDash val="solid"/>
+                    </a:lnB>
+                    <a:solidFill>
+                      <a:srgbClr val="FFFFFF"/>
+                    </a:solidFill>
+                  </a:tcPr>
+                </a:tc>
+                <a:tc>
+                  <a:txBody>
+                    <a:bodyPr/>
+                    <a:p>
+                      <a:pPr algn="ctr">
+                        <a:lnSpc>
+                          <a:spcPct val="120000"/>
+                        </a:lnSpc>
+                        <a:spcBef>
+                          <a:spcPts val="0"/>
+                        </a:spcBef>
+                        <a:spcAft>
+                          <a:spcPts val="0"/>
+                        </a:spcAft>
+                        <a:buNone/>
+                      </a:pPr>
+                      <a:endParaRPr lang="zh-CN" altLang="en-US" sz="100" spc="60">
+                        <a:solidFill>
+                          <a:srgbClr val="404040"/>
+                        </a:solidFill>
+                        <a:latin typeface="微软雅黑" panose="020B0503020204020204" pitchFamily="34" charset="-122"/>
+                        <a:ea typeface="微软雅黑" panose="020B0503020204020204" pitchFamily="34" charset="-122"/>
+                      </a:endParaRPr>
+                    </a:p>
+                  </a:txBody>
+                  <a:tcPr marL="12700" marR="12700" marT="12700" marB="12700" anchor="ctr">
+                    <a:lnL w="6350">
+                      <a:solidFill>
+                        <a:srgbClr val="D9D9D9"/>
+                      </a:solidFill>
+                      <a:prstDash val="solid"/>
+                    </a:lnL>
+                    <a:lnR w="6350">
+                      <a:solidFill>
+                        <a:srgbClr val="D9D9D9"/>
+                      </a:solidFill>
+                      <a:prstDash val="solid"/>
+                    </a:lnR>
+                    <a:lnT>
+                      <a:noFill/>
+                    </a:lnT>
+                    <a:lnB w="19050">
+                      <a:solidFill>
+                        <a:srgbClr val="595959"/>
+                      </a:solidFill>
+                      <a:prstDash val="solid"/>
+                    </a:lnB>
+                    <a:solidFill>
+                      <a:srgbClr val="FFFFFF"/>
+                    </a:solidFill>
+                  </a:tcPr>
+                </a:tc>
+                <a:tc>
+                  <a:txBody>
+                    <a:bodyPr/>
+                    <a:p>
+                      <a:pPr algn="ctr">
+                        <a:lnSpc>
+                          <a:spcPct val="120000"/>
+                        </a:lnSpc>
+                        <a:spcBef>
+                          <a:spcPts val="0"/>
+                        </a:spcBef>
+                        <a:spcAft>
+                          <a:spcPts val="0"/>
+                        </a:spcAft>
+                        <a:buNone/>
+                      </a:pPr>
+                      <a:endParaRPr lang="zh-CN" altLang="en-US" sz="100" spc="60">
+                        <a:solidFill>
+                          <a:srgbClr val="404040"/>
+                        </a:solidFill>
+                        <a:latin typeface="微软雅黑" panose="020B0503020204020204" pitchFamily="34" charset="-122"/>
+                        <a:ea typeface="微软雅黑" panose="020B0503020204020204" pitchFamily="34" charset="-122"/>
+                      </a:endParaRPr>
+                    </a:p>
+                  </a:txBody>
+                  <a:tcPr marL="12700" marR="12700" marT="12700" marB="12700" anchor="ctr">
+                    <a:lnL w="6350">
+                      <a:solidFill>
+                        <a:srgbClr val="D9D9D9"/>
+                      </a:solidFill>
+                      <a:prstDash val="solid"/>
+                    </a:lnL>
+                    <a:lnR w="6350">
+                      <a:solidFill>
+                        <a:srgbClr val="D9D9D9"/>
+                      </a:solidFill>
+                      <a:prstDash val="solid"/>
+                    </a:lnR>
+                    <a:lnT>
+                      <a:noFill/>
+                    </a:lnT>
+                    <a:lnB w="19050">
+                      <a:solidFill>
+                        <a:srgbClr val="595959"/>
+                      </a:solidFill>
+                      <a:prstDash val="solid"/>
+                    </a:lnB>
+                    <a:solidFill>
+                      <a:srgbClr val="FFFFFF"/>
+                    </a:solidFill>
+                  </a:tcPr>
+                </a:tc>
+                <a:tc>
+                  <a:txBody>
+                    <a:bodyPr/>
+                    <a:p>
+                      <a:pPr algn="ctr">
+                        <a:lnSpc>
+                          <a:spcPct val="120000"/>
+                        </a:lnSpc>
+                        <a:spcBef>
+                          <a:spcPts val="0"/>
+                        </a:spcBef>
+                        <a:spcAft>
+                          <a:spcPts val="0"/>
+                        </a:spcAft>
+                        <a:buNone/>
+                      </a:pPr>
+                      <a:endParaRPr lang="zh-CN" altLang="en-US" sz="100" spc="60">
+                        <a:solidFill>
+                          <a:srgbClr val="404040"/>
+                        </a:solidFill>
+                        <a:latin typeface="微软雅黑" panose="020B0503020204020204" pitchFamily="34" charset="-122"/>
+                        <a:ea typeface="微软雅黑" panose="020B0503020204020204" pitchFamily="34" charset="-122"/>
+                      </a:endParaRPr>
+                    </a:p>
+                  </a:txBody>
+                  <a:tcPr marL="12700" marR="12700" marT="12700" marB="12700" anchor="ctr">
+                    <a:lnL w="6350">
+                      <a:solidFill>
+                        <a:srgbClr val="D9D9D9"/>
+                      </a:solidFill>
+                      <a:prstDash val="solid"/>
+                    </a:lnL>
+                    <a:lnR w="6350">
+                      <a:solidFill>
+                        <a:srgbClr val="D9D9D9"/>
+                      </a:solidFill>
+                      <a:prstDash val="solid"/>
+                    </a:lnR>
+                    <a:lnT>
+                      <a:noFill/>
+                    </a:lnT>
+                    <a:lnB w="19050">
+                      <a:solidFill>
+                        <a:srgbClr val="595959"/>
+                      </a:solidFill>
+                      <a:prstDash val="solid"/>
+                    </a:lnB>
+                    <a:solidFill>
+                      <a:srgbClr val="FFFFFF"/>
+                    </a:solidFill>
+                  </a:tcPr>
+                </a:tc>
+                <a:tc>
+                  <a:txBody>
+                    <a:bodyPr/>
+                    <a:p>
+                      <a:pPr algn="ctr">
+                        <a:lnSpc>
+                          <a:spcPct val="120000"/>
+                        </a:lnSpc>
+                        <a:spcBef>
+                          <a:spcPts val="0"/>
+                        </a:spcBef>
+                        <a:spcAft>
+                          <a:spcPts val="0"/>
+                        </a:spcAft>
+                        <a:buNone/>
+                      </a:pPr>
+                      <a:endParaRPr lang="zh-CN" altLang="en-US" sz="100" spc="60">
+                        <a:solidFill>
+                          <a:srgbClr val="404040"/>
+                        </a:solidFill>
+                        <a:latin typeface="微软雅黑" panose="020B0503020204020204" pitchFamily="34" charset="-122"/>
+                        <a:ea typeface="微软雅黑" panose="020B0503020204020204" pitchFamily="34" charset="-122"/>
+                      </a:endParaRPr>
+                    </a:p>
+                  </a:txBody>
+                  <a:tcPr marL="12700" marR="12700" marT="12700" marB="12700" anchor="ctr">
+                    <a:lnL w="6350">
+                      <a:solidFill>
+                        <a:srgbClr val="D9D9D9"/>
+                      </a:solidFill>
+                      <a:prstDash val="solid"/>
+                    </a:lnL>
+                    <a:lnR w="6350">
+                      <a:solidFill>
+                        <a:srgbClr val="D9D9D9"/>
+                      </a:solidFill>
+                      <a:prstDash val="solid"/>
+                    </a:lnR>
+                    <a:lnT>
+                      <a:noFill/>
+                    </a:lnT>
+                    <a:lnB w="19050">
+                      <a:solidFill>
+                        <a:srgbClr val="595959"/>
+                      </a:solidFill>
+                      <a:prstDash val="solid"/>
+                    </a:lnB>
+                    <a:solidFill>
+                      <a:srgbClr val="FFFFFF"/>
+                    </a:solidFill>
+                  </a:tcPr>
+                </a:tc>
+                <a:tc>
+                  <a:txBody>
+                    <a:bodyPr/>
+                    <a:p>
+                      <a:pPr algn="ctr">
+                        <a:lnSpc>
+                          <a:spcPct val="120000"/>
+                        </a:lnSpc>
+                        <a:spcBef>
+                          <a:spcPts val="0"/>
+                        </a:spcBef>
+                        <a:spcAft>
+                          <a:spcPts val="0"/>
+                        </a:spcAft>
+                        <a:buNone/>
+                      </a:pPr>
+                      <a:endParaRPr lang="zh-CN" altLang="en-US" sz="100" spc="60">
+                        <a:solidFill>
+                          <a:srgbClr val="404040"/>
+                        </a:solidFill>
+                        <a:latin typeface="微软雅黑" panose="020B0503020204020204" pitchFamily="34" charset="-122"/>
+                        <a:ea typeface="微软雅黑" panose="020B0503020204020204" pitchFamily="34" charset="-122"/>
+                      </a:endParaRPr>
+                    </a:p>
+                  </a:txBody>
+                  <a:tcPr marL="12700" marR="12700" marT="12700" marB="12700" anchor="ctr">
+                    <a:lnL w="6350">
+                      <a:solidFill>
+                        <a:srgbClr val="D9D9D9"/>
+                      </a:solidFill>
+                      <a:prstDash val="solid"/>
+                    </a:lnL>
+                    <a:lnR>
+                      <a:noFill/>
+                    </a:lnR>
+                    <a:lnT>
+                      <a:noFill/>
+                    </a:lnT>
+                    <a:lnB w="19050">
+                      <a:solidFill>
+                        <a:srgbClr val="595959"/>
+                      </a:solidFill>
+                      <a:prstDash val="solid"/>
+                    </a:lnB>
+                    <a:solidFill>
+                      <a:srgbClr val="FFFFFF"/>
+                    </a:solidFill>
+                  </a:tcPr>
+                </a:tc>
+              </a:tr>
+            </a:tbl>
+          </a:graphicData>
+        </a:graphic>
+      </p:graphicFrame>
+      <p:sp>
+        <p:nvSpPr>
+          <p:cNvPr id="18" name="椭圆 17"/>
+          <p:cNvSpPr/>
+          <p:nvPr/>
+        </p:nvSpPr>
+        <p:spPr>
+          <a:xfrm>
+            <a:off x="6247765" y="2839085"/>
+            <a:ext cx="1768475" cy="1682750"/>
+          </a:xfrm>
+          <a:prstGeom prst="ellipse">
+            <a:avLst/>
+          </a:prstGeom>
+        </p:spPr>
+        <p:style>
+          <a:lnRef idx="3">
+            <a:schemeClr val="lt1"/>
+          </a:lnRef>
+          <a:fillRef idx="1">
+            <a:schemeClr val="accent5"/>
+          </a:fillRef>
+          <a:effectRef idx="1">
+            <a:schemeClr val="accent5"/>
+          </a:effectRef>
+          <a:fontRef idx="minor">
+            <a:schemeClr val="lt1"/>
+          </a:fontRef>
+        </p:style>
+        <p:txBody>
+          <a:bodyPr rtlCol="0" anchor="ctr"/>
+          <a:p>
+            <a:pPr algn="ctr"/>
+            <a:endParaRPr lang="zh-CN" altLang="en-US"/>
+          </a:p>
+        </p:txBody>
+      </p:sp>
+      <p:cxnSp>
+        <p:nvCxnSpPr>
+          <p:cNvPr id="21" name="直接连接符 20"/>
+          <p:cNvCxnSpPr>
+            <a:stCxn id="18" idx="1"/>
+            <a:endCxn id="18" idx="5"/>
+          </p:cNvCxnSpPr>
+          <p:nvPr/>
+        </p:nvCxnSpPr>
+        <p:spPr>
+          <a:xfrm>
+            <a:off x="6506845" y="3085465"/>
+            <a:ext cx="1250315" cy="1189990"/>
+          </a:xfrm>
+          <a:prstGeom prst="line">
+            <a:avLst/>
+          </a:prstGeom>
+        </p:spPr>
+        <p:style>
+          <a:lnRef idx="3">
+            <a:schemeClr val="dk1"/>
+          </a:lnRef>
+          <a:fillRef idx="0">
+            <a:schemeClr val="dk1"/>
+          </a:fillRef>
+          <a:effectRef idx="2">
+            <a:schemeClr val="dk1"/>
+          </a:effectRef>
+          <a:fontRef idx="minor">
+            <a:schemeClr val="tx1"/>
+          </a:fontRef>
+        </p:style>
+      </p:cxnSp>
+      <p:cxnSp>
+        <p:nvCxnSpPr>
+          <p:cNvPr id="22" name="直接连接符 21"/>
+          <p:cNvCxnSpPr>
+            <a:stCxn id="18" idx="0"/>
+            <a:endCxn id="18" idx="4"/>
+          </p:cNvCxnSpPr>
+          <p:nvPr/>
+        </p:nvCxnSpPr>
+        <p:spPr>
+          <a:xfrm>
+            <a:off x="7132320" y="2839085"/>
+            <a:ext cx="0" cy="1682750"/>
+          </a:xfrm>
+          <a:prstGeom prst="line">
+            <a:avLst/>
+          </a:prstGeom>
+        </p:spPr>
+        <p:style>
+          <a:lnRef idx="3">
+            <a:schemeClr val="dk1"/>
+          </a:lnRef>
+          <a:fillRef idx="0">
+            <a:schemeClr val="dk1"/>
+          </a:fillRef>
+          <a:effectRef idx="2">
+            <a:schemeClr val="dk1"/>
+          </a:effectRef>
+          <a:fontRef idx="minor">
+            <a:schemeClr val="tx1"/>
+          </a:fontRef>
+        </p:style>
+      </p:cxnSp>
+      <p:cxnSp>
+        <p:nvCxnSpPr>
+          <p:cNvPr id="23" name="直接连接符 22"/>
+          <p:cNvCxnSpPr>
+            <a:stCxn id="18" idx="7"/>
+            <a:endCxn id="18" idx="3"/>
+          </p:cNvCxnSpPr>
+          <p:nvPr/>
+        </p:nvCxnSpPr>
+        <p:spPr>
+          <a:xfrm flipH="1">
+            <a:off x="6506845" y="3085465"/>
+            <a:ext cx="1250315" cy="1189990"/>
+          </a:xfrm>
+          <a:prstGeom prst="line">
+            <a:avLst/>
+          </a:prstGeom>
+        </p:spPr>
+        <p:style>
+          <a:lnRef idx="3">
+            <a:schemeClr val="dk1"/>
+          </a:lnRef>
+          <a:fillRef idx="0">
+            <a:schemeClr val="dk1"/>
+          </a:fillRef>
+          <a:effectRef idx="2">
+            <a:schemeClr val="dk1"/>
+          </a:effectRef>
+          <a:fontRef idx="minor">
+            <a:schemeClr val="tx1"/>
+          </a:fontRef>
+        </p:style>
+      </p:cxnSp>
+      <p:cxnSp>
+        <p:nvCxnSpPr>
+          <p:cNvPr id="24" name="直接连接符 23"/>
+          <p:cNvCxnSpPr>
+            <a:stCxn id="18" idx="6"/>
+            <a:endCxn id="18" idx="2"/>
+          </p:cNvCxnSpPr>
+          <p:nvPr/>
+        </p:nvCxnSpPr>
+        <p:spPr>
+          <a:xfrm flipH="1">
+            <a:off x="6247765" y="3680460"/>
+            <a:ext cx="1768475" cy="0"/>
+          </a:xfrm>
+          <a:prstGeom prst="line">
+            <a:avLst/>
+          </a:prstGeom>
+        </p:spPr>
+        <p:style>
+          <a:lnRef idx="3">
+            <a:schemeClr val="dk1"/>
+          </a:lnRef>
+          <a:fillRef idx="0">
+            <a:schemeClr val="dk1"/>
+          </a:fillRef>
+          <a:effectRef idx="2">
+            <a:schemeClr val="dk1"/>
+          </a:effectRef>
+          <a:fontRef idx="minor">
+            <a:schemeClr val="tx1"/>
+          </a:fontRef>
+        </p:style>
+      </p:cxnSp>
+      <p:cxnSp>
+        <p:nvCxnSpPr>
+          <p:cNvPr id="26" name="直接连接符 25"/>
+          <p:cNvCxnSpPr/>
+          <p:nvPr/>
+        </p:nvCxnSpPr>
+        <p:spPr>
+          <a:xfrm flipH="1">
+            <a:off x="6809105" y="2902585"/>
+            <a:ext cx="656590" cy="1578610"/>
+          </a:xfrm>
+          <a:prstGeom prst="line">
+            <a:avLst/>
+          </a:prstGeom>
+        </p:spPr>
+        <p:style>
+          <a:lnRef idx="3">
+            <a:schemeClr val="dk1"/>
+          </a:lnRef>
+          <a:fillRef idx="0">
+            <a:schemeClr val="dk1"/>
+          </a:fillRef>
+          <a:effectRef idx="2">
+            <a:schemeClr val="dk1"/>
+          </a:effectRef>
+          <a:fontRef idx="minor">
+            <a:schemeClr val="tx1"/>
+          </a:fontRef>
+        </p:style>
+      </p:cxnSp>
+      <p:cxnSp>
+        <p:nvCxnSpPr>
+          <p:cNvPr id="27" name="直接连接符 26"/>
+          <p:cNvCxnSpPr/>
+          <p:nvPr/>
+        </p:nvCxnSpPr>
+        <p:spPr>
+          <a:xfrm>
+            <a:off x="6774815" y="2920365"/>
+            <a:ext cx="737235" cy="1533525"/>
+          </a:xfrm>
+          <a:prstGeom prst="line">
+            <a:avLst/>
+          </a:prstGeom>
+        </p:spPr>
+        <p:style>
+          <a:lnRef idx="3">
+            <a:schemeClr val="dk1"/>
+          </a:lnRef>
+          <a:fillRef idx="0">
+            <a:schemeClr val="dk1"/>
+          </a:fillRef>
+          <a:effectRef idx="2">
+            <a:schemeClr val="dk1"/>
+          </a:effectRef>
+          <a:fontRef idx="minor">
+            <a:schemeClr val="tx1"/>
+          </a:fontRef>
+        </p:style>
+      </p:cxnSp>
+      <p:cxnSp>
+        <p:nvCxnSpPr>
+          <p:cNvPr id="28" name="直接连接符 27"/>
+          <p:cNvCxnSpPr/>
+          <p:nvPr/>
+        </p:nvCxnSpPr>
+        <p:spPr>
+          <a:xfrm flipH="1">
+            <a:off x="6322060" y="3352800"/>
+            <a:ext cx="1626235" cy="636905"/>
+          </a:xfrm>
+          <a:prstGeom prst="line">
+            <a:avLst/>
+          </a:prstGeom>
+        </p:spPr>
+        <p:style>
+          <a:lnRef idx="3">
+            <a:schemeClr val="dk1"/>
+          </a:lnRef>
+          <a:fillRef idx="0">
+            <a:schemeClr val="dk1"/>
+          </a:fillRef>
+          <a:effectRef idx="2">
+            <a:schemeClr val="dk1"/>
+          </a:effectRef>
+          <a:fontRef idx="minor">
+            <a:schemeClr val="tx1"/>
+          </a:fontRef>
+        </p:style>
+      </p:cxnSp>
+      <p:cxnSp>
+        <p:nvCxnSpPr>
+          <p:cNvPr id="29" name="直接连接符 28"/>
+          <p:cNvCxnSpPr/>
+          <p:nvPr/>
+        </p:nvCxnSpPr>
+        <p:spPr>
+          <a:xfrm flipH="1" flipV="1">
+            <a:off x="6303645" y="3361055"/>
+            <a:ext cx="1654810" cy="646430"/>
+          </a:xfrm>
+          <a:prstGeom prst="line">
+            <a:avLst/>
+          </a:prstGeom>
+        </p:spPr>
+        <p:style>
+          <a:lnRef idx="3">
+            <a:schemeClr val="dk1"/>
+          </a:lnRef>
+          <a:fillRef idx="0">
+            <a:schemeClr val="dk1"/>
+          </a:fillRef>
+          <a:effectRef idx="2">
+            <a:schemeClr val="dk1"/>
+          </a:effectRef>
+          <a:fontRef idx="minor">
+            <a:schemeClr val="tx1"/>
+          </a:fontRef>
+        </p:style>
+      </p:cxnSp>
+      <p:sp>
+        <p:nvSpPr>
+          <p:cNvPr id="30" name="椭圆 29"/>
+          <p:cNvSpPr/>
+          <p:nvPr/>
+        </p:nvSpPr>
+        <p:spPr>
+          <a:xfrm>
+            <a:off x="6506845" y="3075305"/>
+            <a:ext cx="1226820" cy="1233170"/>
+          </a:xfrm>
+          <a:prstGeom prst="ellipse">
+            <a:avLst/>
+          </a:prstGeom>
+        </p:spPr>
+        <p:style>
+          <a:lnRef idx="1">
+            <a:schemeClr val="accent4"/>
+          </a:lnRef>
+          <a:fillRef idx="2">
+            <a:schemeClr val="accent4"/>
+          </a:fillRef>
+          <a:effectRef idx="1">
+            <a:schemeClr val="accent4"/>
+          </a:effectRef>
+          <a:fontRef idx="minor">
+            <a:schemeClr val="dk1"/>
+          </a:fontRef>
+        </p:style>
+        <p:txBody>
+          <a:bodyPr rtlCol="0" anchor="ctr"/>
+          <a:p>
+            <a:pPr algn="ctr"/>
+            <a:r>
+              <a:rPr lang="en-US" altLang="zh-CN"/>
+              <a:t>Redo</a:t>
+            </a:r>
+            <a:endParaRPr lang="en-US" altLang="zh-CN"/>
+          </a:p>
+          <a:p>
+            <a:pPr algn="ctr"/>
+            <a:r>
+              <a:rPr lang="en-US" altLang="zh-CN"/>
+              <a:t>Log</a:t>
+            </a:r>
+            <a:endParaRPr lang="en-US" altLang="zh-CN"/>
+          </a:p>
+          <a:p>
+            <a:pPr algn="ctr"/>
+            <a:r>
+              <a:rPr lang="en-US" altLang="zh-CN"/>
+              <a:t>Buffer</a:t>
+            </a:r>
+            <a:endParaRPr lang="en-US" altLang="zh-CN"/>
+          </a:p>
+        </p:txBody>
+      </p:sp>
+      <p:sp>
+        <p:nvSpPr>
+          <p:cNvPr id="39" name="矩形 38"/>
+          <p:cNvSpPr/>
+          <p:nvPr/>
+        </p:nvSpPr>
+        <p:spPr>
+          <a:xfrm>
+            <a:off x="2949575" y="3989705"/>
+            <a:ext cx="1347470" cy="270000"/>
+          </a:xfrm>
+          <a:prstGeom prst="rect">
+            <a:avLst/>
+          </a:prstGeom>
+        </p:spPr>
+        <p:style>
+          <a:lnRef idx="1">
+            <a:schemeClr val="accent6"/>
+          </a:lnRef>
+          <a:fillRef idx="2">
+            <a:schemeClr val="accent6"/>
+          </a:fillRef>
+          <a:effectRef idx="1">
+            <a:schemeClr val="accent6"/>
+          </a:effectRef>
+          <a:fontRef idx="minor">
+            <a:schemeClr val="dk1"/>
+          </a:fontRef>
+        </p:style>
+        <p:txBody>
+          <a:bodyPr rtlCol="0" anchor="ctr"/>
+          <a:p>
+            <a:pPr algn="ctr"/>
+            <a:r>
+              <a:rPr lang="en-US" altLang="zh-CN" sz="900"/>
+              <a:t>Data Dictionary Cache</a:t>
+            </a:r>
+            <a:endParaRPr lang="en-US" altLang="zh-CN" sz="900"/>
+          </a:p>
+        </p:txBody>
+      </p:sp>
+      <p:sp>
+        <p:nvSpPr>
+          <p:cNvPr id="32" name="矩形 31"/>
+          <p:cNvSpPr/>
+          <p:nvPr/>
+        </p:nvSpPr>
+        <p:spPr>
+          <a:xfrm>
+            <a:off x="2954655" y="4308475"/>
+            <a:ext cx="1347470" cy="270000"/>
+          </a:xfrm>
+          <a:prstGeom prst="rect">
+            <a:avLst/>
+          </a:prstGeom>
+        </p:spPr>
+        <p:style>
+          <a:lnRef idx="1">
+            <a:schemeClr val="accent6"/>
+          </a:lnRef>
+          <a:fillRef idx="2">
+            <a:schemeClr val="accent6"/>
+          </a:fillRef>
+          <a:effectRef idx="1">
+            <a:schemeClr val="accent6"/>
+          </a:effectRef>
+          <a:fontRef idx="minor">
+            <a:schemeClr val="dk1"/>
+          </a:fontRef>
+        </p:style>
+        <p:txBody>
+          <a:bodyPr rtlCol="0" anchor="ctr"/>
+          <a:p>
+            <a:pPr algn="ctr"/>
+            <a:r>
+              <a:rPr lang="en-US" altLang="zh-CN" sz="900"/>
+              <a:t>Server Result Cache</a:t>
+            </a:r>
+            <a:endParaRPr lang="en-US" altLang="zh-CN" sz="900"/>
+          </a:p>
+        </p:txBody>
+      </p:sp>
+    </p:spTree>
+    <p:custDataLst>
+      <p:tags r:id="rId3"/>
+    </p:custDataLst>
+  </p:cSld>
+  <p:clrMapOvr>
+    <a:masterClrMapping/>
+  </p:clrMapOvr>
+</p:sld>
+</file>
+
+<file path=ppt/slides/slide4.xml><?xml version="1.0" encoding="utf-8"?>
+<p:sld xmlns:a="http://schemas.openxmlformats.org/drawingml/2006/main" xmlns:r="http://schemas.openxmlformats.org/officeDocument/2006/relationships" xmlns:p="http://schemas.openxmlformats.org/presentationml/2006/main">
+  <p:cSld>
+    <p:spTree>
+      <p:nvGrpSpPr>
+        <p:cNvPr id="1" name=""/>
+        <p:cNvGrpSpPr/>
+        <p:nvPr/>
+      </p:nvGrpSpPr>
+      <p:grpSpPr>
+        <a:xfrm>
+          <a:off x="0" y="0"/>
+          <a:ext cx="0" cy="0"/>
+          <a:chOff x="0" y="0"/>
+          <a:chExt cx="0" cy="0"/>
+        </a:xfrm>
+      </p:grpSpPr>
+      <p:sp>
+        <p:nvSpPr>
           <p:cNvPr id="4" name="椭圆 3"/>
           <p:cNvSpPr/>
           <p:nvPr/>
@@ -6170,7 +9680,7 @@
 </p:sld>
 </file>
 
-<file path=ppt/slides/slide4.xml><?xml version="1.0" encoding="utf-8"?>
+<file path=ppt/slides/slide5.xml><?xml version="1.0" encoding="utf-8"?>
 <p:sld xmlns:a="http://schemas.openxmlformats.org/drawingml/2006/main" xmlns:r="http://schemas.openxmlformats.org/officeDocument/2006/relationships" xmlns:p="http://schemas.openxmlformats.org/presentationml/2006/main">
   <p:cSld>
     <p:spTree>
@@ -7386,6 +10896,32 @@
 
 <file path=ppt/tags/tag65.xml><?xml version="1.0" encoding="utf-8"?>
 <p:tagLst xmlns:p="http://schemas.openxmlformats.org/presentationml/2006/main">
+  <p:tag name="KSO_WM_UNIT_TABLE_BEAUTIFY" val="smartTable{372f7eca-1245-4237-b1f4-0f99314756eb}"/>
+  <p:tag name="TABLE_ENDDRAG_ORIGIN_RECT" val="79*59"/>
+  <p:tag name="TABLE_ENDDRAG_RECT" val="371*278*79*59"/>
+  <p:tag name="TABLE_AUTOADJUST_FLAG" val="1"/>
+  <p:tag name="TABLE_EMPHASIZE_COLOR" val="14905447"/>
+  <p:tag name="TABLE_SKINIDX" val="3"/>
+  <p:tag name="TABLE_COLORIDX" val="7"/>
+  <p:tag name="TABLE_COLOR_RGB" val="0x000000*0xFFFFFF*0x212121*0xFFFFFF*0xF98638*0xFFB829*0x37BECC*0x1687A5*0x3A3A47*0xC7DADD"/>
+</p:tagLst>
+</file>
+
+<file path=ppt/tags/tag66.xml><?xml version="1.0" encoding="utf-8"?>
+<p:tagLst xmlns:p="http://schemas.openxmlformats.org/presentationml/2006/main">
+  <p:tag name="KSO_WM_UNIT_TABLE_BEAUTIFY" val="smartTable{b09115c8-8024-4765-83fe-712160fe2ed0}"/>
+  <p:tag name="TABLE_ENDDRAG_ORIGIN_RECT" val="97*42"/>
+  <p:tag name="TABLE_ENDDRAG_RECT" val="519*247*97*42"/>
+  <p:tag name="TABLE_AUTOADJUST_FLAG" val="1"/>
+  <p:tag name="TABLE_EMPHASIZE_COLOR" val="16754589"/>
+  <p:tag name="TABLE_SKINIDX" val="3"/>
+  <p:tag name="TABLE_COLORIDX" val="16"/>
+  <p:tag name="TABLE_COLOR_RGB" val="0x000000*0xFFFFFF*0x212121*0xFFFFFF*0xFFA79D*0xFED585*0xFEF284*0xC3E29E*0xABE9FE*0x96AFEF"/>
+</p:tagLst>
+</file>
+
+<file path=ppt/tags/tag67.xml><?xml version="1.0" encoding="utf-8"?>
+<p:tagLst xmlns:p="http://schemas.openxmlformats.org/presentationml/2006/main">
   <p:tag name="KSO_WM_SLIDE_ID" val="custom20205176_1"/>
   <p:tag name="KSO_WM_TEMPLATE_SUBCATEGORY" val="19"/>
   <p:tag name="KSO_WM_TEMPLATE_MASTER_TYPE" val="0"/>
@@ -7405,7 +10941,28 @@
 </p:tagLst>
 </file>
 
-<file path=ppt/tags/tag66.xml><?xml version="1.0" encoding="utf-8"?>
+<file path=ppt/tags/tag68.xml><?xml version="1.0" encoding="utf-8"?>
+<p:tagLst xmlns:p="http://schemas.openxmlformats.org/presentationml/2006/main">
+  <p:tag name="KSO_WM_SLIDE_ID" val="custom20205176_1"/>
+  <p:tag name="KSO_WM_TEMPLATE_SUBCATEGORY" val="19"/>
+  <p:tag name="KSO_WM_TEMPLATE_MASTER_TYPE" val="0"/>
+  <p:tag name="KSO_WM_TEMPLATE_COLOR_TYPE" val="1"/>
+  <p:tag name="KSO_WM_SLIDE_TYPE" val="title"/>
+  <p:tag name="KSO_WM_SLIDE_SUBTYPE" val="defaultBlank"/>
+  <p:tag name="KSO_WM_SLIDE_ITEM_CNT" val="0"/>
+  <p:tag name="KSO_WM_SLIDE_INDEX" val="1"/>
+  <p:tag name="KSO_WM_TAG_VERSION" val="1.0"/>
+  <p:tag name="KSO_WM_BEAUTIFY_FLAG" val="#wm#"/>
+  <p:tag name="KSO_WM_TEMPLATE_CATEGORY" val="custom"/>
+  <p:tag name="KSO_WM_TEMPLATE_INDEX" val="20205176"/>
+  <p:tag name="KSO_WM_SLIDE_LAYOUT" val="a_b"/>
+  <p:tag name="KSO_WM_SLIDE_LAYOUT_CNT" val="1_1"/>
+  <p:tag name="KSO_WM_UNIT_SHOW_EDIT_AREA_INDICATION" val="1"/>
+  <p:tag name="KSO_WM_TEMPLATE_THUMBS_INDEX" val="1、4、7、12、13、14、15、16、17、18、20、24、25、28、33、36、40、43、44"/>
+</p:tagLst>
+</file>
+
+<file path=ppt/tags/tag69.xml><?xml version="1.0" encoding="utf-8"?>
 <p:tagLst xmlns:p="http://schemas.openxmlformats.org/presentationml/2006/main">
   <p:tag name="KSO_WM_SLIDE_ID" val="custom20205176_1"/>
   <p:tag name="KSO_WM_TEMPLATE_SUBCATEGORY" val="19"/>

</xml_diff>